<commit_message>
Updated with body condition stuff
</commit_message>
<xml_diff>
--- a/Krill size plots.pptx
+++ b/Krill size plots.pptx
@@ -7,18 +7,29 @@
   <p:sldIdLst>
     <p:sldId id="256" r:id="rId2"/>
     <p:sldId id="257" r:id="rId3"/>
-    <p:sldId id="258" r:id="rId4"/>
-    <p:sldId id="260" r:id="rId5"/>
-    <p:sldId id="261" r:id="rId6"/>
-    <p:sldId id="262" r:id="rId7"/>
-    <p:sldId id="263" r:id="rId8"/>
-    <p:sldId id="264" r:id="rId9"/>
-    <p:sldId id="265" r:id="rId10"/>
-    <p:sldId id="266" r:id="rId11"/>
-    <p:sldId id="267" r:id="rId12"/>
-    <p:sldId id="268" r:id="rId13"/>
-    <p:sldId id="269" r:id="rId14"/>
-    <p:sldId id="270" r:id="rId15"/>
+    <p:sldId id="273" r:id="rId4"/>
+    <p:sldId id="258" r:id="rId5"/>
+    <p:sldId id="260" r:id="rId6"/>
+    <p:sldId id="261" r:id="rId7"/>
+    <p:sldId id="262" r:id="rId8"/>
+    <p:sldId id="263" r:id="rId9"/>
+    <p:sldId id="272" r:id="rId10"/>
+    <p:sldId id="271" r:id="rId11"/>
+    <p:sldId id="274" r:id="rId12"/>
+    <p:sldId id="275" r:id="rId13"/>
+    <p:sldId id="276" r:id="rId14"/>
+    <p:sldId id="264" r:id="rId15"/>
+    <p:sldId id="277" r:id="rId16"/>
+    <p:sldId id="278" r:id="rId17"/>
+    <p:sldId id="279" r:id="rId18"/>
+    <p:sldId id="265" r:id="rId19"/>
+    <p:sldId id="266" r:id="rId20"/>
+    <p:sldId id="267" r:id="rId21"/>
+    <p:sldId id="268" r:id="rId22"/>
+    <p:sldId id="280" r:id="rId23"/>
+    <p:sldId id="281" r:id="rId24"/>
+    <p:sldId id="269" r:id="rId25"/>
+    <p:sldId id="270" r:id="rId26"/>
   </p:sldIdLst>
   <p:sldSz cx="12192000" cy="6858000"/>
   <p:notesSz cx="6858000" cy="9144000"/>
@@ -117,6 +128,11 @@
       </a:defRPr>
     </a:lvl9pPr>
   </p:defaultTextStyle>
+  <p:extLst>
+    <p:ext uri="{EFAFB233-063F-42B5-8137-9DF3F51BA10A}">
+      <p15:sldGuideLst xmlns:p15="http://schemas.microsoft.com/office/powerpoint/2012/main"/>
+    </p:ext>
+  </p:extLst>
 </p:presentation>
 </file>
 
@@ -251,7 +267,7 @@
           <a:p>
             <a:fld id="{413859D0-E984-4ECA-9756-CA5763017495}" type="datetimeFigureOut">
               <a:rPr lang="en-US" smtClean="0"/>
-              <a:t>8/31/2020</a:t>
+              <a:t>10/9/2020</a:t>
             </a:fld>
             <a:endParaRPr lang="en-US"/>
           </a:p>
@@ -421,7 +437,7 @@
           <a:p>
             <a:fld id="{413859D0-E984-4ECA-9756-CA5763017495}" type="datetimeFigureOut">
               <a:rPr lang="en-US" smtClean="0"/>
-              <a:t>8/31/2020</a:t>
+              <a:t>10/9/2020</a:t>
             </a:fld>
             <a:endParaRPr lang="en-US"/>
           </a:p>
@@ -601,7 +617,7 @@
           <a:p>
             <a:fld id="{413859D0-E984-4ECA-9756-CA5763017495}" type="datetimeFigureOut">
               <a:rPr lang="en-US" smtClean="0"/>
-              <a:t>8/31/2020</a:t>
+              <a:t>10/9/2020</a:t>
             </a:fld>
             <a:endParaRPr lang="en-US"/>
           </a:p>
@@ -771,7 +787,7 @@
           <a:p>
             <a:fld id="{413859D0-E984-4ECA-9756-CA5763017495}" type="datetimeFigureOut">
               <a:rPr lang="en-US" smtClean="0"/>
-              <a:t>8/31/2020</a:t>
+              <a:t>10/9/2020</a:t>
             </a:fld>
             <a:endParaRPr lang="en-US"/>
           </a:p>
@@ -1017,7 +1033,7 @@
           <a:p>
             <a:fld id="{413859D0-E984-4ECA-9756-CA5763017495}" type="datetimeFigureOut">
               <a:rPr lang="en-US" smtClean="0"/>
-              <a:t>8/31/2020</a:t>
+              <a:t>10/9/2020</a:t>
             </a:fld>
             <a:endParaRPr lang="en-US"/>
           </a:p>
@@ -1249,7 +1265,7 @@
           <a:p>
             <a:fld id="{413859D0-E984-4ECA-9756-CA5763017495}" type="datetimeFigureOut">
               <a:rPr lang="en-US" smtClean="0"/>
-              <a:t>8/31/2020</a:t>
+              <a:t>10/9/2020</a:t>
             </a:fld>
             <a:endParaRPr lang="en-US"/>
           </a:p>
@@ -1616,7 +1632,7 @@
           <a:p>
             <a:fld id="{413859D0-E984-4ECA-9756-CA5763017495}" type="datetimeFigureOut">
               <a:rPr lang="en-US" smtClean="0"/>
-              <a:t>8/31/2020</a:t>
+              <a:t>10/9/2020</a:t>
             </a:fld>
             <a:endParaRPr lang="en-US"/>
           </a:p>
@@ -1734,7 +1750,7 @@
           <a:p>
             <a:fld id="{413859D0-E984-4ECA-9756-CA5763017495}" type="datetimeFigureOut">
               <a:rPr lang="en-US" smtClean="0"/>
-              <a:t>8/31/2020</a:t>
+              <a:t>10/9/2020</a:t>
             </a:fld>
             <a:endParaRPr lang="en-US"/>
           </a:p>
@@ -1829,7 +1845,7 @@
           <a:p>
             <a:fld id="{413859D0-E984-4ECA-9756-CA5763017495}" type="datetimeFigureOut">
               <a:rPr lang="en-US" smtClean="0"/>
-              <a:t>8/31/2020</a:t>
+              <a:t>10/9/2020</a:t>
             </a:fld>
             <a:endParaRPr lang="en-US"/>
           </a:p>
@@ -2106,7 +2122,7 @@
           <a:p>
             <a:fld id="{413859D0-E984-4ECA-9756-CA5763017495}" type="datetimeFigureOut">
               <a:rPr lang="en-US" smtClean="0"/>
-              <a:t>8/31/2020</a:t>
+              <a:t>10/9/2020</a:t>
             </a:fld>
             <a:endParaRPr lang="en-US"/>
           </a:p>
@@ -2359,7 +2375,7 @@
           <a:p>
             <a:fld id="{413859D0-E984-4ECA-9756-CA5763017495}" type="datetimeFigureOut">
               <a:rPr lang="en-US" smtClean="0"/>
-              <a:t>8/31/2020</a:t>
+              <a:t>10/9/2020</a:t>
             </a:fld>
             <a:endParaRPr lang="en-US"/>
           </a:p>
@@ -2572,7 +2588,7 @@
           <a:p>
             <a:fld id="{413859D0-E984-4ECA-9756-CA5763017495}" type="datetimeFigureOut">
               <a:rPr lang="en-US" smtClean="0"/>
-              <a:t>8/31/2020</a:t>
+              <a:t>10/9/2020</a:t>
             </a:fld>
             <a:endParaRPr lang="en-US"/>
           </a:p>
@@ -3066,7 +3082,7 @@
           <a:p>
             <a:r>
               <a:rPr lang="en-US" dirty="0" smtClean="0"/>
-              <a:t>Telson length comparison by MOATS</a:t>
+              <a:t>Weight at treatment</a:t>
             </a:r>
             <a:endParaRPr lang="en-US" dirty="0"/>
           </a:p>
@@ -3074,13 +3090,11 @@
       </p:sp>
       <p:pic>
         <p:nvPicPr>
-          <p:cNvPr id="4" name="Content Placeholder 3"/>
+          <p:cNvPr id="5" name="Picture 4"/>
           <p:cNvPicPr>
-            <a:picLocks noGrp="1" noChangeAspect="1"/>
+            <a:picLocks noChangeAspect="1"/>
           </p:cNvPicPr>
-          <p:nvPr>
-            <p:ph idx="1"/>
-          </p:nvPr>
+          <p:nvPr/>
         </p:nvPicPr>
         <p:blipFill>
           <a:blip r:embed="rId2"/>
@@ -3090,8 +3104,8 @@
         </p:blipFill>
         <p:spPr>
           <a:xfrm>
-            <a:off x="2322667" y="1988755"/>
-            <a:ext cx="7546666" cy="4657371"/>
+            <a:off x="2220385" y="1690688"/>
+            <a:ext cx="7751229" cy="4783616"/>
           </a:xfrm>
           <a:prstGeom prst="rect">
             <a:avLst/>
@@ -3101,7 +3115,7 @@
     </p:spTree>
     <p:extLst>
       <p:ext uri="{BB962C8B-B14F-4D97-AF65-F5344CB8AC3E}">
-        <p14:creationId xmlns:p14="http://schemas.microsoft.com/office/powerpoint/2010/main" val="1774631344"/>
+        <p14:creationId xmlns:p14="http://schemas.microsoft.com/office/powerpoint/2010/main" val="551857268"/>
       </p:ext>
     </p:extLst>
   </p:cSld>
@@ -3145,7 +3159,7 @@
           <a:p>
             <a:r>
               <a:rPr lang="en-US" dirty="0" smtClean="0"/>
-              <a:t>Treatment comparison of weight</a:t>
+              <a:t>Weight by length at treatment</a:t>
             </a:r>
             <a:endParaRPr lang="en-US" dirty="0"/>
           </a:p>
@@ -3169,8 +3183,8 @@
         </p:blipFill>
         <p:spPr>
           <a:xfrm>
-            <a:off x="2351489" y="1983051"/>
-            <a:ext cx="7489021" cy="4621796"/>
+            <a:off x="1976244" y="1690688"/>
+            <a:ext cx="8239512" cy="5084956"/>
           </a:xfrm>
           <a:prstGeom prst="rect">
             <a:avLst/>
@@ -3180,7 +3194,7 @@
     </p:spTree>
     <p:extLst>
       <p:ext uri="{BB962C8B-B14F-4D97-AF65-F5344CB8AC3E}">
-        <p14:creationId xmlns:p14="http://schemas.microsoft.com/office/powerpoint/2010/main" val="1132337531"/>
+        <p14:creationId xmlns:p14="http://schemas.microsoft.com/office/powerpoint/2010/main" val="423664979"/>
       </p:ext>
     </p:extLst>
   </p:cSld>
@@ -3224,7 +3238,7 @@
           <a:p>
             <a:r>
               <a:rPr lang="en-US" dirty="0" smtClean="0"/>
-              <a:t>Wet weight comparison by MOATS</a:t>
+              <a:t>Krill body condition at treatment</a:t>
             </a:r>
             <a:endParaRPr lang="en-US" dirty="0"/>
           </a:p>
@@ -3248,8 +3262,849 @@
         </p:blipFill>
         <p:spPr>
           <a:xfrm>
-            <a:off x="2262280" y="1992279"/>
+            <a:off x="1966772" y="1690688"/>
+            <a:ext cx="8258455" cy="5096647"/>
+          </a:xfrm>
+          <a:prstGeom prst="rect">
+            <a:avLst/>
+          </a:prstGeom>
+        </p:spPr>
+      </p:pic>
+    </p:spTree>
+    <p:extLst>
+      <p:ext uri="{BB962C8B-B14F-4D97-AF65-F5344CB8AC3E}">
+        <p14:creationId xmlns:p14="http://schemas.microsoft.com/office/powerpoint/2010/main" val="3126891838"/>
+      </p:ext>
+    </p:extLst>
+  </p:cSld>
+  <p:clrMapOvr>
+    <a:masterClrMapping/>
+  </p:clrMapOvr>
+</p:sld>
+</file>
+
+<file path=ppt/slides/slide13.xml><?xml version="1.0" encoding="utf-8"?>
+<p:sld xmlns:a="http://schemas.openxmlformats.org/drawingml/2006/main" xmlns:r="http://schemas.openxmlformats.org/officeDocument/2006/relationships" xmlns:p="http://schemas.openxmlformats.org/presentationml/2006/main">
+  <p:cSld>
+    <p:spTree>
+      <p:nvGrpSpPr>
+        <p:cNvPr id="1" name=""/>
+        <p:cNvGrpSpPr/>
+        <p:nvPr/>
+      </p:nvGrpSpPr>
+      <p:grpSpPr>
+        <a:xfrm>
+          <a:off x="0" y="0"/>
+          <a:ext cx="0" cy="0"/>
+          <a:chOff x="0" y="0"/>
+          <a:chExt cx="0" cy="0"/>
+        </a:xfrm>
+      </p:grpSpPr>
+      <p:sp>
+        <p:nvSpPr>
+          <p:cNvPr id="2" name="Title 1"/>
+          <p:cNvSpPr>
+            <a:spLocks noGrp="1"/>
+          </p:cNvSpPr>
+          <p:nvPr>
+            <p:ph type="title"/>
+          </p:nvPr>
+        </p:nvSpPr>
+        <p:spPr/>
+        <p:txBody>
+          <a:bodyPr/>
+          <a:lstStyle/>
+          <a:p>
+            <a:r>
+              <a:rPr lang="en-US" dirty="0" smtClean="0"/>
+              <a:t>Body condition at treatment by MOATS</a:t>
+            </a:r>
+            <a:endParaRPr lang="en-US" dirty="0"/>
+          </a:p>
+        </p:txBody>
+      </p:sp>
+      <p:pic>
+        <p:nvPicPr>
+          <p:cNvPr id="4" name="Content Placeholder 3"/>
+          <p:cNvPicPr>
+            <a:picLocks noGrp="1" noChangeAspect="1"/>
+          </p:cNvPicPr>
+          <p:nvPr>
+            <p:ph idx="1"/>
+          </p:nvPr>
+        </p:nvPicPr>
+        <p:blipFill>
+          <a:blip r:embed="rId2"/>
+          <a:stretch>
+            <a:fillRect/>
+          </a:stretch>
+        </p:blipFill>
+        <p:spPr>
+          <a:xfrm>
+            <a:off x="2156343" y="1690688"/>
+            <a:ext cx="7879313" cy="4862662"/>
+          </a:xfrm>
+          <a:prstGeom prst="rect">
+            <a:avLst/>
+          </a:prstGeom>
+        </p:spPr>
+      </p:pic>
+    </p:spTree>
+    <p:extLst>
+      <p:ext uri="{BB962C8B-B14F-4D97-AF65-F5344CB8AC3E}">
+        <p14:creationId xmlns:p14="http://schemas.microsoft.com/office/powerpoint/2010/main" val="270110278"/>
+      </p:ext>
+    </p:extLst>
+  </p:cSld>
+  <p:clrMapOvr>
+    <a:masterClrMapping/>
+  </p:clrMapOvr>
+</p:sld>
+</file>
+
+<file path=ppt/slides/slide14.xml><?xml version="1.0" encoding="utf-8"?>
+<p:sld xmlns:a="http://schemas.openxmlformats.org/drawingml/2006/main" xmlns:r="http://schemas.openxmlformats.org/officeDocument/2006/relationships" xmlns:p="http://schemas.openxmlformats.org/presentationml/2006/main">
+  <p:cSld>
+    <p:spTree>
+      <p:nvGrpSpPr>
+        <p:cNvPr id="1" name=""/>
+        <p:cNvGrpSpPr/>
+        <p:nvPr/>
+      </p:nvGrpSpPr>
+      <p:grpSpPr>
+        <a:xfrm>
+          <a:off x="0" y="0"/>
+          <a:ext cx="0" cy="0"/>
+          <a:chOff x="0" y="0"/>
+          <a:chExt cx="0" cy="0"/>
+        </a:xfrm>
+      </p:grpSpPr>
+      <p:sp>
+        <p:nvSpPr>
+          <p:cNvPr id="2" name="Title 1"/>
+          <p:cNvSpPr>
+            <a:spLocks noGrp="1"/>
+          </p:cNvSpPr>
+          <p:nvPr>
+            <p:ph type="title"/>
+          </p:nvPr>
+        </p:nvSpPr>
+        <p:spPr/>
+        <p:txBody>
+          <a:bodyPr/>
+          <a:lstStyle/>
+          <a:p>
+            <a:r>
+              <a:rPr lang="en-US" dirty="0" smtClean="0"/>
+              <a:t>Basic stats</a:t>
+            </a:r>
+            <a:endParaRPr lang="en-US" dirty="0"/>
+          </a:p>
+        </p:txBody>
+      </p:sp>
+      <p:graphicFrame>
+        <p:nvGraphicFramePr>
+          <p:cNvPr id="7" name="Object 6"/>
+          <p:cNvGraphicFramePr>
+            <a:graphicFrameLocks noChangeAspect="1"/>
+          </p:cNvGraphicFramePr>
+          <p:nvPr>
+            <p:extLst>
+              <p:ext uri="{D42A27DB-BD31-4B8C-83A1-F6EECF244321}">
+                <p14:modId xmlns:p14="http://schemas.microsoft.com/office/powerpoint/2010/main" val="3214993825"/>
+              </p:ext>
+            </p:extLst>
+          </p:nvPr>
+        </p:nvGraphicFramePr>
+        <p:xfrm>
+          <a:off x="55754" y="3110187"/>
+          <a:ext cx="12080491" cy="887949"/>
+        </p:xfrm>
+        <a:graphic>
+          <a:graphicData uri="http://schemas.openxmlformats.org/presentationml/2006/ole">
+            <mc:AlternateContent xmlns:mc="http://schemas.openxmlformats.org/markup-compatibility/2006">
+              <mc:Choice xmlns:v="urn:schemas-microsoft-com:vml" Requires="v">
+                <p:oleObj spid="_x0000_s2054" name="Worksheet" r:id="rId3" imgW="10496378" imgH="771525" progId="Excel.Sheet.12">
+                  <p:embed/>
+                </p:oleObj>
+              </mc:Choice>
+              <mc:Fallback>
+                <p:oleObj name="Worksheet" r:id="rId3" imgW="10496378" imgH="771525" progId="Excel.Sheet.12">
+                  <p:embed/>
+                  <p:pic>
+                    <p:nvPicPr>
+                      <p:cNvPr id="0" name=""/>
+                      <p:cNvPicPr/>
+                      <p:nvPr/>
+                    </p:nvPicPr>
+                    <p:blipFill>
+                      <a:blip r:embed="rId4"/>
+                      <a:stretch>
+                        <a:fillRect/>
+                      </a:stretch>
+                    </p:blipFill>
+                    <p:spPr>
+                      <a:xfrm>
+                        <a:off x="55754" y="3110187"/>
+                        <a:ext cx="12080491" cy="887949"/>
+                      </a:xfrm>
+                      <a:prstGeom prst="rect">
+                        <a:avLst/>
+                      </a:prstGeom>
+                    </p:spPr>
+                  </p:pic>
+                </p:oleObj>
+              </mc:Fallback>
+            </mc:AlternateContent>
+          </a:graphicData>
+        </a:graphic>
+      </p:graphicFrame>
+    </p:spTree>
+    <p:extLst>
+      <p:ext uri="{BB962C8B-B14F-4D97-AF65-F5344CB8AC3E}">
+        <p14:creationId xmlns:p14="http://schemas.microsoft.com/office/powerpoint/2010/main" val="3803969312"/>
+      </p:ext>
+    </p:extLst>
+  </p:cSld>
+  <p:clrMapOvr>
+    <a:masterClrMapping/>
+  </p:clrMapOvr>
+</p:sld>
+</file>
+
+<file path=ppt/slides/slide15.xml><?xml version="1.0" encoding="utf-8"?>
+<p:sld xmlns:a="http://schemas.openxmlformats.org/drawingml/2006/main" xmlns:r="http://schemas.openxmlformats.org/officeDocument/2006/relationships" xmlns:p="http://schemas.openxmlformats.org/presentationml/2006/main">
+  <p:cSld>
+    <p:spTree>
+      <p:nvGrpSpPr>
+        <p:cNvPr id="1" name=""/>
+        <p:cNvGrpSpPr/>
+        <p:nvPr/>
+      </p:nvGrpSpPr>
+      <p:grpSpPr>
+        <a:xfrm>
+          <a:off x="0" y="0"/>
+          <a:ext cx="0" cy="0"/>
+          <a:chOff x="0" y="0"/>
+          <a:chExt cx="0" cy="0"/>
+        </a:xfrm>
+      </p:grpSpPr>
+      <p:sp>
+        <p:nvSpPr>
+          <p:cNvPr id="2" name="Title 1"/>
+          <p:cNvSpPr>
+            <a:spLocks noGrp="1"/>
+          </p:cNvSpPr>
+          <p:nvPr>
+            <p:ph type="title"/>
+          </p:nvPr>
+        </p:nvSpPr>
+        <p:spPr/>
+        <p:txBody>
+          <a:bodyPr/>
+          <a:lstStyle/>
+          <a:p>
+            <a:r>
+              <a:rPr lang="en-US" dirty="0" smtClean="0"/>
+              <a:t>Correlation of telson length and wet weight</a:t>
+            </a:r>
+            <a:endParaRPr lang="en-US" dirty="0"/>
+          </a:p>
+        </p:txBody>
+      </p:sp>
+      <p:pic>
+        <p:nvPicPr>
+          <p:cNvPr id="4" name="Content Placeholder 3"/>
+          <p:cNvPicPr>
+            <a:picLocks noGrp="1" noChangeAspect="1"/>
+          </p:cNvPicPr>
+          <p:nvPr>
+            <p:ph idx="1"/>
+          </p:nvPr>
+        </p:nvPicPr>
+        <p:blipFill>
+          <a:blip r:embed="rId2"/>
+          <a:stretch>
+            <a:fillRect/>
+          </a:stretch>
+        </p:blipFill>
+        <p:spPr>
+          <a:xfrm>
+            <a:off x="2262280" y="1690688"/>
             <a:ext cx="7667440" cy="4731906"/>
+          </a:xfrm>
+          <a:prstGeom prst="rect">
+            <a:avLst/>
+          </a:prstGeom>
+        </p:spPr>
+      </p:pic>
+    </p:spTree>
+    <p:extLst>
+      <p:ext uri="{BB962C8B-B14F-4D97-AF65-F5344CB8AC3E}">
+        <p14:creationId xmlns:p14="http://schemas.microsoft.com/office/powerpoint/2010/main" val="3053374340"/>
+      </p:ext>
+    </p:extLst>
+  </p:cSld>
+  <p:clrMapOvr>
+    <a:masterClrMapping/>
+  </p:clrMapOvr>
+</p:sld>
+</file>
+
+<file path=ppt/slides/slide16.xml><?xml version="1.0" encoding="utf-8"?>
+<p:sld xmlns:a="http://schemas.openxmlformats.org/drawingml/2006/main" xmlns:r="http://schemas.openxmlformats.org/officeDocument/2006/relationships" xmlns:p="http://schemas.openxmlformats.org/presentationml/2006/main">
+  <p:cSld>
+    <p:spTree>
+      <p:nvGrpSpPr>
+        <p:cNvPr id="1" name=""/>
+        <p:cNvGrpSpPr/>
+        <p:nvPr/>
+      </p:nvGrpSpPr>
+      <p:grpSpPr>
+        <a:xfrm>
+          <a:off x="0" y="0"/>
+          <a:ext cx="0" cy="0"/>
+          <a:chOff x="0" y="0"/>
+          <a:chExt cx="0" cy="0"/>
+        </a:xfrm>
+      </p:grpSpPr>
+      <p:sp>
+        <p:nvSpPr>
+          <p:cNvPr id="2" name="Title 1"/>
+          <p:cNvSpPr>
+            <a:spLocks noGrp="1"/>
+          </p:cNvSpPr>
+          <p:nvPr>
+            <p:ph type="title"/>
+          </p:nvPr>
+        </p:nvSpPr>
+        <p:spPr/>
+        <p:txBody>
+          <a:bodyPr/>
+          <a:lstStyle/>
+          <a:p>
+            <a:r>
+              <a:rPr lang="en-US" dirty="0" smtClean="0"/>
+              <a:t>LM of telson length fixed at treatment</a:t>
+            </a:r>
+            <a:endParaRPr lang="en-US" dirty="0"/>
+          </a:p>
+        </p:txBody>
+      </p:sp>
+      <p:pic>
+        <p:nvPicPr>
+          <p:cNvPr id="4" name="Content Placeholder 3"/>
+          <p:cNvPicPr>
+            <a:picLocks noGrp="1" noChangeAspect="1"/>
+          </p:cNvPicPr>
+          <p:nvPr>
+            <p:ph idx="1"/>
+          </p:nvPr>
+        </p:nvPicPr>
+        <p:blipFill>
+          <a:blip r:embed="rId2"/>
+          <a:stretch>
+            <a:fillRect/>
+          </a:stretch>
+        </p:blipFill>
+        <p:spPr>
+          <a:xfrm>
+            <a:off x="2620537" y="2129842"/>
+            <a:ext cx="6337958" cy="4414627"/>
+          </a:xfrm>
+          <a:prstGeom prst="rect">
+            <a:avLst/>
+          </a:prstGeom>
+        </p:spPr>
+      </p:pic>
+    </p:spTree>
+    <p:extLst>
+      <p:ext uri="{BB962C8B-B14F-4D97-AF65-F5344CB8AC3E}">
+        <p14:creationId xmlns:p14="http://schemas.microsoft.com/office/powerpoint/2010/main" val="1661914331"/>
+      </p:ext>
+    </p:extLst>
+  </p:cSld>
+  <p:clrMapOvr>
+    <a:masterClrMapping/>
+  </p:clrMapOvr>
+</p:sld>
+</file>
+
+<file path=ppt/slides/slide17.xml><?xml version="1.0" encoding="utf-8"?>
+<p:sld xmlns:a="http://schemas.openxmlformats.org/drawingml/2006/main" xmlns:r="http://schemas.openxmlformats.org/officeDocument/2006/relationships" xmlns:p="http://schemas.openxmlformats.org/presentationml/2006/main">
+  <p:cSld>
+    <p:spTree>
+      <p:nvGrpSpPr>
+        <p:cNvPr id="1" name=""/>
+        <p:cNvGrpSpPr/>
+        <p:nvPr/>
+      </p:nvGrpSpPr>
+      <p:grpSpPr>
+        <a:xfrm>
+          <a:off x="0" y="0"/>
+          <a:ext cx="0" cy="0"/>
+          <a:chOff x="0" y="0"/>
+          <a:chExt cx="0" cy="0"/>
+        </a:xfrm>
+      </p:grpSpPr>
+      <p:sp>
+        <p:nvSpPr>
+          <p:cNvPr id="2" name="Title 1"/>
+          <p:cNvSpPr>
+            <a:spLocks noGrp="1"/>
+          </p:cNvSpPr>
+          <p:nvPr>
+            <p:ph type="title"/>
+          </p:nvPr>
+        </p:nvSpPr>
+        <p:spPr/>
+        <p:txBody>
+          <a:bodyPr/>
+          <a:lstStyle/>
+          <a:p>
+            <a:r>
+              <a:rPr lang="en-US" dirty="0"/>
+              <a:t>LM of telson </a:t>
+            </a:r>
+            <a:r>
+              <a:rPr lang="en-US" dirty="0" smtClean="0"/>
+              <a:t>weight </a:t>
+            </a:r>
+            <a:r>
+              <a:rPr lang="en-US" dirty="0"/>
+              <a:t>fixed at treatment</a:t>
+            </a:r>
+          </a:p>
+        </p:txBody>
+      </p:sp>
+      <p:pic>
+        <p:nvPicPr>
+          <p:cNvPr id="4" name="Content Placeholder 3"/>
+          <p:cNvPicPr>
+            <a:picLocks noGrp="1" noChangeAspect="1"/>
+          </p:cNvPicPr>
+          <p:nvPr>
+            <p:ph idx="1"/>
+          </p:nvPr>
+        </p:nvPicPr>
+        <p:blipFill>
+          <a:blip r:embed="rId2"/>
+          <a:stretch>
+            <a:fillRect/>
+          </a:stretch>
+        </p:blipFill>
+        <p:spPr>
+          <a:xfrm>
+            <a:off x="3166307" y="1916713"/>
+            <a:ext cx="5859385" cy="4700750"/>
+          </a:xfrm>
+          <a:prstGeom prst="rect">
+            <a:avLst/>
+          </a:prstGeom>
+        </p:spPr>
+      </p:pic>
+    </p:spTree>
+    <p:extLst>
+      <p:ext uri="{BB962C8B-B14F-4D97-AF65-F5344CB8AC3E}">
+        <p14:creationId xmlns:p14="http://schemas.microsoft.com/office/powerpoint/2010/main" val="1864186638"/>
+      </p:ext>
+    </p:extLst>
+  </p:cSld>
+  <p:clrMapOvr>
+    <a:masterClrMapping/>
+  </p:clrMapOvr>
+</p:sld>
+</file>
+
+<file path=ppt/slides/slide18.xml><?xml version="1.0" encoding="utf-8"?>
+<p:sld xmlns:a="http://schemas.openxmlformats.org/drawingml/2006/main" xmlns:r="http://schemas.openxmlformats.org/officeDocument/2006/relationships" xmlns:p="http://schemas.openxmlformats.org/presentationml/2006/main">
+  <p:cSld>
+    <p:spTree>
+      <p:nvGrpSpPr>
+        <p:cNvPr id="1" name=""/>
+        <p:cNvGrpSpPr/>
+        <p:nvPr/>
+      </p:nvGrpSpPr>
+      <p:grpSpPr>
+        <a:xfrm>
+          <a:off x="0" y="0"/>
+          <a:ext cx="0" cy="0"/>
+          <a:chOff x="0" y="0"/>
+          <a:chExt cx="0" cy="0"/>
+        </a:xfrm>
+      </p:grpSpPr>
+      <p:sp>
+        <p:nvSpPr>
+          <p:cNvPr id="2" name="Title 1"/>
+          <p:cNvSpPr>
+            <a:spLocks noGrp="1"/>
+          </p:cNvSpPr>
+          <p:nvPr>
+            <p:ph type="title"/>
+          </p:nvPr>
+        </p:nvSpPr>
+        <p:spPr>
+          <a:xfrm>
+            <a:off x="838200" y="365126"/>
+            <a:ext cx="10123449" cy="883812"/>
+          </a:xfrm>
+        </p:spPr>
+        <p:txBody>
+          <a:bodyPr/>
+          <a:lstStyle/>
+          <a:p>
+            <a:r>
+              <a:rPr lang="en-US" dirty="0" smtClean="0"/>
+              <a:t>Treatment comparison of TL</a:t>
+            </a:r>
+            <a:endParaRPr lang="en-US" dirty="0"/>
+          </a:p>
+        </p:txBody>
+      </p:sp>
+      <p:pic>
+        <p:nvPicPr>
+          <p:cNvPr id="5" name="Content Placeholder 4"/>
+          <p:cNvPicPr>
+            <a:picLocks noGrp="1" noChangeAspect="1"/>
+          </p:cNvPicPr>
+          <p:nvPr>
+            <p:ph idx="1"/>
+          </p:nvPr>
+        </p:nvPicPr>
+        <p:blipFill>
+          <a:blip r:embed="rId2"/>
+          <a:stretch>
+            <a:fillRect/>
+          </a:stretch>
+        </p:blipFill>
+        <p:spPr>
+          <a:xfrm>
+            <a:off x="2077355" y="1542707"/>
+            <a:ext cx="7645138" cy="4718142"/>
+          </a:xfrm>
+          <a:prstGeom prst="rect">
+            <a:avLst/>
+          </a:prstGeom>
+        </p:spPr>
+      </p:pic>
+    </p:spTree>
+    <p:extLst>
+      <p:ext uri="{BB962C8B-B14F-4D97-AF65-F5344CB8AC3E}">
+        <p14:creationId xmlns:p14="http://schemas.microsoft.com/office/powerpoint/2010/main" val="242548804"/>
+      </p:ext>
+    </p:extLst>
+  </p:cSld>
+  <p:clrMapOvr>
+    <a:masterClrMapping/>
+  </p:clrMapOvr>
+</p:sld>
+</file>
+
+<file path=ppt/slides/slide19.xml><?xml version="1.0" encoding="utf-8"?>
+<p:sld xmlns:a="http://schemas.openxmlformats.org/drawingml/2006/main" xmlns:r="http://schemas.openxmlformats.org/officeDocument/2006/relationships" xmlns:p="http://schemas.openxmlformats.org/presentationml/2006/main">
+  <p:cSld>
+    <p:spTree>
+      <p:nvGrpSpPr>
+        <p:cNvPr id="1" name=""/>
+        <p:cNvGrpSpPr/>
+        <p:nvPr/>
+      </p:nvGrpSpPr>
+      <p:grpSpPr>
+        <a:xfrm>
+          <a:off x="0" y="0"/>
+          <a:ext cx="0" cy="0"/>
+          <a:chOff x="0" y="0"/>
+          <a:chExt cx="0" cy="0"/>
+        </a:xfrm>
+      </p:grpSpPr>
+      <p:sp>
+        <p:nvSpPr>
+          <p:cNvPr id="2" name="Title 1"/>
+          <p:cNvSpPr>
+            <a:spLocks noGrp="1"/>
+          </p:cNvSpPr>
+          <p:nvPr>
+            <p:ph type="title"/>
+          </p:nvPr>
+        </p:nvSpPr>
+        <p:spPr/>
+        <p:txBody>
+          <a:bodyPr/>
+          <a:lstStyle/>
+          <a:p>
+            <a:r>
+              <a:rPr lang="en-US" dirty="0" smtClean="0"/>
+              <a:t>Telson length comparison by MOATS</a:t>
+            </a:r>
+            <a:endParaRPr lang="en-US" dirty="0"/>
+          </a:p>
+        </p:txBody>
+      </p:sp>
+      <p:pic>
+        <p:nvPicPr>
+          <p:cNvPr id="5" name="Content Placeholder 4"/>
+          <p:cNvPicPr>
+            <a:picLocks noGrp="1" noChangeAspect="1"/>
+          </p:cNvPicPr>
+          <p:nvPr>
+            <p:ph idx="1"/>
+          </p:nvPr>
+        </p:nvPicPr>
+        <p:blipFill>
+          <a:blip r:embed="rId2"/>
+          <a:stretch>
+            <a:fillRect/>
+          </a:stretch>
+        </p:blipFill>
+        <p:spPr>
+          <a:xfrm>
+            <a:off x="2273431" y="1690688"/>
+            <a:ext cx="7645138" cy="4718142"/>
+          </a:xfrm>
+          <a:prstGeom prst="rect">
+            <a:avLst/>
+          </a:prstGeom>
+        </p:spPr>
+      </p:pic>
+    </p:spTree>
+    <p:extLst>
+      <p:ext uri="{BB962C8B-B14F-4D97-AF65-F5344CB8AC3E}">
+        <p14:creationId xmlns:p14="http://schemas.microsoft.com/office/powerpoint/2010/main" val="1774631344"/>
+      </p:ext>
+    </p:extLst>
+  </p:cSld>
+  <p:clrMapOvr>
+    <a:masterClrMapping/>
+  </p:clrMapOvr>
+</p:sld>
+</file>
+
+<file path=ppt/slides/slide2.xml><?xml version="1.0" encoding="utf-8"?>
+<p:sld xmlns:a="http://schemas.openxmlformats.org/drawingml/2006/main" xmlns:r="http://schemas.openxmlformats.org/officeDocument/2006/relationships" xmlns:p="http://schemas.openxmlformats.org/presentationml/2006/main">
+  <p:cSld>
+    <p:spTree>
+      <p:nvGrpSpPr>
+        <p:cNvPr id="1" name=""/>
+        <p:cNvGrpSpPr/>
+        <p:nvPr/>
+      </p:nvGrpSpPr>
+      <p:grpSpPr>
+        <a:xfrm>
+          <a:off x="0" y="0"/>
+          <a:ext cx="0" cy="0"/>
+          <a:chOff x="0" y="0"/>
+          <a:chExt cx="0" cy="0"/>
+        </a:xfrm>
+      </p:grpSpPr>
+      <p:sp>
+        <p:nvSpPr>
+          <p:cNvPr id="2" name="Title 1"/>
+          <p:cNvSpPr>
+            <a:spLocks noGrp="1"/>
+          </p:cNvSpPr>
+          <p:nvPr>
+            <p:ph type="title"/>
+          </p:nvPr>
+        </p:nvSpPr>
+        <p:spPr>
+          <a:xfrm>
+            <a:off x="638696" y="681008"/>
+            <a:ext cx="10425544" cy="906723"/>
+          </a:xfrm>
+        </p:spPr>
+        <p:txBody>
+          <a:bodyPr>
+            <a:normAutofit fontScale="90000"/>
+          </a:bodyPr>
+          <a:lstStyle/>
+          <a:p>
+            <a:pPr algn="ctr"/>
+            <a:r>
+              <a:rPr lang="en-US" dirty="0" smtClean="0"/>
+              <a:t>Basic scatter plot of telson length vs. wet weight</a:t>
+            </a:r>
+            <a:endParaRPr lang="en-US" dirty="0"/>
+          </a:p>
+        </p:txBody>
+      </p:sp>
+      <p:pic>
+        <p:nvPicPr>
+          <p:cNvPr id="5" name="Content Placeholder 4"/>
+          <p:cNvPicPr>
+            <a:picLocks noGrp="1" noChangeAspect="1"/>
+          </p:cNvPicPr>
+          <p:nvPr>
+            <p:ph idx="1"/>
+          </p:nvPr>
+        </p:nvPicPr>
+        <p:blipFill>
+          <a:blip r:embed="rId2"/>
+          <a:stretch>
+            <a:fillRect/>
+          </a:stretch>
+        </p:blipFill>
+        <p:spPr>
+          <a:xfrm>
+            <a:off x="1942956" y="1587731"/>
+            <a:ext cx="7817024" cy="4824220"/>
+          </a:xfrm>
+          <a:prstGeom prst="rect">
+            <a:avLst/>
+          </a:prstGeom>
+        </p:spPr>
+      </p:pic>
+    </p:spTree>
+    <p:extLst>
+      <p:ext uri="{BB962C8B-B14F-4D97-AF65-F5344CB8AC3E}">
+        <p14:creationId xmlns:p14="http://schemas.microsoft.com/office/powerpoint/2010/main" val="1974424397"/>
+      </p:ext>
+    </p:extLst>
+  </p:cSld>
+  <p:clrMapOvr>
+    <a:masterClrMapping/>
+  </p:clrMapOvr>
+</p:sld>
+</file>
+
+<file path=ppt/slides/slide20.xml><?xml version="1.0" encoding="utf-8"?>
+<p:sld xmlns:a="http://schemas.openxmlformats.org/drawingml/2006/main" xmlns:r="http://schemas.openxmlformats.org/officeDocument/2006/relationships" xmlns:p="http://schemas.openxmlformats.org/presentationml/2006/main">
+  <p:cSld>
+    <p:spTree>
+      <p:nvGrpSpPr>
+        <p:cNvPr id="1" name=""/>
+        <p:cNvGrpSpPr/>
+        <p:nvPr/>
+      </p:nvGrpSpPr>
+      <p:grpSpPr>
+        <a:xfrm>
+          <a:off x="0" y="0"/>
+          <a:ext cx="0" cy="0"/>
+          <a:chOff x="0" y="0"/>
+          <a:chExt cx="0" cy="0"/>
+        </a:xfrm>
+      </p:grpSpPr>
+      <p:sp>
+        <p:nvSpPr>
+          <p:cNvPr id="2" name="Title 1"/>
+          <p:cNvSpPr>
+            <a:spLocks noGrp="1"/>
+          </p:cNvSpPr>
+          <p:nvPr>
+            <p:ph type="title"/>
+          </p:nvPr>
+        </p:nvSpPr>
+        <p:spPr/>
+        <p:txBody>
+          <a:bodyPr/>
+          <a:lstStyle/>
+          <a:p>
+            <a:r>
+              <a:rPr lang="en-US" dirty="0" smtClean="0"/>
+              <a:t>Treatment comparison of weight</a:t>
+            </a:r>
+            <a:endParaRPr lang="en-US" dirty="0"/>
+          </a:p>
+        </p:txBody>
+      </p:sp>
+      <p:pic>
+        <p:nvPicPr>
+          <p:cNvPr id="5" name="Content Placeholder 4"/>
+          <p:cNvPicPr>
+            <a:picLocks noGrp="1" noChangeAspect="1"/>
+          </p:cNvPicPr>
+          <p:nvPr>
+            <p:ph idx="1"/>
+          </p:nvPr>
+        </p:nvPicPr>
+        <p:blipFill>
+          <a:blip r:embed="rId2"/>
+          <a:stretch>
+            <a:fillRect/>
+          </a:stretch>
+        </p:blipFill>
+        <p:spPr>
+          <a:xfrm>
+            <a:off x="2178114" y="1520405"/>
+            <a:ext cx="7835771" cy="4835790"/>
+          </a:xfrm>
+          <a:prstGeom prst="rect">
+            <a:avLst/>
+          </a:prstGeom>
+        </p:spPr>
+      </p:pic>
+    </p:spTree>
+    <p:extLst>
+      <p:ext uri="{BB962C8B-B14F-4D97-AF65-F5344CB8AC3E}">
+        <p14:creationId xmlns:p14="http://schemas.microsoft.com/office/powerpoint/2010/main" val="1132337531"/>
+      </p:ext>
+    </p:extLst>
+  </p:cSld>
+  <p:clrMapOvr>
+    <a:masterClrMapping/>
+  </p:clrMapOvr>
+</p:sld>
+</file>
+
+<file path=ppt/slides/slide21.xml><?xml version="1.0" encoding="utf-8"?>
+<p:sld xmlns:a="http://schemas.openxmlformats.org/drawingml/2006/main" xmlns:r="http://schemas.openxmlformats.org/officeDocument/2006/relationships" xmlns:p="http://schemas.openxmlformats.org/presentationml/2006/main">
+  <p:cSld>
+    <p:spTree>
+      <p:nvGrpSpPr>
+        <p:cNvPr id="1" name=""/>
+        <p:cNvGrpSpPr/>
+        <p:nvPr/>
+      </p:nvGrpSpPr>
+      <p:grpSpPr>
+        <a:xfrm>
+          <a:off x="0" y="0"/>
+          <a:ext cx="0" cy="0"/>
+          <a:chOff x="0" y="0"/>
+          <a:chExt cx="0" cy="0"/>
+        </a:xfrm>
+      </p:grpSpPr>
+      <p:sp>
+        <p:nvSpPr>
+          <p:cNvPr id="2" name="Title 1"/>
+          <p:cNvSpPr>
+            <a:spLocks noGrp="1"/>
+          </p:cNvSpPr>
+          <p:nvPr>
+            <p:ph type="title"/>
+          </p:nvPr>
+        </p:nvSpPr>
+        <p:spPr/>
+        <p:txBody>
+          <a:bodyPr/>
+          <a:lstStyle/>
+          <a:p>
+            <a:r>
+              <a:rPr lang="en-US" dirty="0" smtClean="0"/>
+              <a:t>Wet weight comparison by MOATS</a:t>
+            </a:r>
+            <a:endParaRPr lang="en-US" dirty="0"/>
+          </a:p>
+        </p:txBody>
+      </p:sp>
+      <p:pic>
+        <p:nvPicPr>
+          <p:cNvPr id="5" name="Content Placeholder 4"/>
+          <p:cNvPicPr>
+            <a:picLocks noGrp="1" noChangeAspect="1"/>
+          </p:cNvPicPr>
+          <p:nvPr>
+            <p:ph idx="1"/>
+          </p:nvPr>
+        </p:nvPicPr>
+        <p:blipFill>
+          <a:blip r:embed="rId2"/>
+          <a:stretch>
+            <a:fillRect/>
+          </a:stretch>
+        </p:blipFill>
+        <p:spPr>
+          <a:xfrm>
+            <a:off x="2195372" y="1690688"/>
+            <a:ext cx="7801255" cy="4814489"/>
           </a:xfrm>
           <a:prstGeom prst="rect">
             <a:avLst/>
@@ -3269,7 +4124,173 @@
 </p:sld>
 </file>
 
-<file path=ppt/slides/slide13.xml><?xml version="1.0" encoding="utf-8"?>
+<file path=ppt/slides/slide22.xml><?xml version="1.0" encoding="utf-8"?>
+<p:sld xmlns:a="http://schemas.openxmlformats.org/drawingml/2006/main" xmlns:r="http://schemas.openxmlformats.org/officeDocument/2006/relationships" xmlns:p="http://schemas.openxmlformats.org/presentationml/2006/main">
+  <p:cSld>
+    <p:spTree>
+      <p:nvGrpSpPr>
+        <p:cNvPr id="1" name=""/>
+        <p:cNvGrpSpPr/>
+        <p:nvPr/>
+      </p:nvGrpSpPr>
+      <p:grpSpPr>
+        <a:xfrm>
+          <a:off x="0" y="0"/>
+          <a:ext cx="0" cy="0"/>
+          <a:chOff x="0" y="0"/>
+          <a:chExt cx="0" cy="0"/>
+        </a:xfrm>
+      </p:grpSpPr>
+      <p:sp>
+        <p:nvSpPr>
+          <p:cNvPr id="2" name="Title 1"/>
+          <p:cNvSpPr>
+            <a:spLocks noGrp="1"/>
+          </p:cNvSpPr>
+          <p:nvPr>
+            <p:ph type="title"/>
+          </p:nvPr>
+        </p:nvSpPr>
+        <p:spPr/>
+        <p:txBody>
+          <a:bodyPr/>
+          <a:lstStyle/>
+          <a:p>
+            <a:r>
+              <a:rPr lang="en-US" dirty="0"/>
+              <a:t>Treatment comparison of </a:t>
+            </a:r>
+            <a:r>
+              <a:rPr lang="en-US" dirty="0" smtClean="0"/>
+              <a:t>body condition</a:t>
+            </a:r>
+            <a:endParaRPr lang="en-US" dirty="0"/>
+          </a:p>
+        </p:txBody>
+      </p:sp>
+      <p:pic>
+        <p:nvPicPr>
+          <p:cNvPr id="4" name="Content Placeholder 3"/>
+          <p:cNvPicPr>
+            <a:picLocks noGrp="1" noChangeAspect="1"/>
+          </p:cNvPicPr>
+          <p:nvPr>
+            <p:ph idx="1"/>
+          </p:nvPr>
+        </p:nvPicPr>
+        <p:blipFill>
+          <a:blip r:embed="rId2"/>
+          <a:stretch>
+            <a:fillRect/>
+          </a:stretch>
+        </p:blipFill>
+        <p:spPr>
+          <a:xfrm>
+            <a:off x="2173070" y="1690688"/>
+            <a:ext cx="7845860" cy="4842017"/>
+          </a:xfrm>
+          <a:prstGeom prst="rect">
+            <a:avLst/>
+          </a:prstGeom>
+        </p:spPr>
+      </p:pic>
+    </p:spTree>
+    <p:extLst>
+      <p:ext uri="{BB962C8B-B14F-4D97-AF65-F5344CB8AC3E}">
+        <p14:creationId xmlns:p14="http://schemas.microsoft.com/office/powerpoint/2010/main" val="2883542531"/>
+      </p:ext>
+    </p:extLst>
+  </p:cSld>
+  <p:clrMapOvr>
+    <a:masterClrMapping/>
+  </p:clrMapOvr>
+</p:sld>
+</file>
+
+<file path=ppt/slides/slide23.xml><?xml version="1.0" encoding="utf-8"?>
+<p:sld xmlns:a="http://schemas.openxmlformats.org/drawingml/2006/main" xmlns:r="http://schemas.openxmlformats.org/officeDocument/2006/relationships" xmlns:p="http://schemas.openxmlformats.org/presentationml/2006/main">
+  <p:cSld>
+    <p:spTree>
+      <p:nvGrpSpPr>
+        <p:cNvPr id="1" name=""/>
+        <p:cNvGrpSpPr/>
+        <p:nvPr/>
+      </p:nvGrpSpPr>
+      <p:grpSpPr>
+        <a:xfrm>
+          <a:off x="0" y="0"/>
+          <a:ext cx="0" cy="0"/>
+          <a:chOff x="0" y="0"/>
+          <a:chExt cx="0" cy="0"/>
+        </a:xfrm>
+      </p:grpSpPr>
+      <p:sp>
+        <p:nvSpPr>
+          <p:cNvPr id="2" name="Title 1"/>
+          <p:cNvSpPr>
+            <a:spLocks noGrp="1"/>
+          </p:cNvSpPr>
+          <p:nvPr>
+            <p:ph type="title"/>
+          </p:nvPr>
+        </p:nvSpPr>
+        <p:spPr/>
+        <p:txBody>
+          <a:bodyPr/>
+          <a:lstStyle/>
+          <a:p>
+            <a:r>
+              <a:rPr lang="en-US" smtClean="0"/>
+              <a:t>Body condition </a:t>
+            </a:r>
+            <a:r>
+              <a:rPr lang="en-US" dirty="0" smtClean="0"/>
+              <a:t>comparison by MOATS</a:t>
+            </a:r>
+            <a:endParaRPr lang="en-US" dirty="0"/>
+          </a:p>
+        </p:txBody>
+      </p:sp>
+      <p:pic>
+        <p:nvPicPr>
+          <p:cNvPr id="4" name="Content Placeholder 3"/>
+          <p:cNvPicPr>
+            <a:picLocks noGrp="1" noChangeAspect="1"/>
+          </p:cNvPicPr>
+          <p:nvPr>
+            <p:ph idx="1"/>
+          </p:nvPr>
+        </p:nvPicPr>
+        <p:blipFill>
+          <a:blip r:embed="rId2"/>
+          <a:stretch>
+            <a:fillRect/>
+          </a:stretch>
+        </p:blipFill>
+        <p:spPr>
+          <a:xfrm>
+            <a:off x="2241356" y="1854942"/>
+            <a:ext cx="7709288" cy="4757732"/>
+          </a:xfrm>
+          <a:prstGeom prst="rect">
+            <a:avLst/>
+          </a:prstGeom>
+        </p:spPr>
+      </p:pic>
+    </p:spTree>
+    <p:extLst>
+      <p:ext uri="{BB962C8B-B14F-4D97-AF65-F5344CB8AC3E}">
+        <p14:creationId xmlns:p14="http://schemas.microsoft.com/office/powerpoint/2010/main" val="1573771286"/>
+      </p:ext>
+    </p:extLst>
+  </p:cSld>
+  <p:clrMapOvr>
+    <a:masterClrMapping/>
+  </p:clrMapOvr>
+</p:sld>
+</file>
+
+<file path=ppt/slides/slide24.xml><?xml version="1.0" encoding="utf-8"?>
 <p:sld xmlns:a="http://schemas.openxmlformats.org/drawingml/2006/main" xmlns:r="http://schemas.openxmlformats.org/officeDocument/2006/relationships" xmlns:p="http://schemas.openxmlformats.org/presentationml/2006/main">
   <p:cSld>
     <p:spTree>
@@ -3348,7 +4369,7 @@
 </p:sld>
 </file>
 
-<file path=ppt/slides/slide14.xml><?xml version="1.0" encoding="utf-8"?>
+<file path=ppt/slides/slide25.xml><?xml version="1.0" encoding="utf-8"?>
 <p:sld xmlns:a="http://schemas.openxmlformats.org/drawingml/2006/main" xmlns:r="http://schemas.openxmlformats.org/officeDocument/2006/relationships" xmlns:p="http://schemas.openxmlformats.org/presentationml/2006/main">
   <p:cSld>
     <p:spTree>
@@ -3427,93 +4448,6 @@
 </p:sld>
 </file>
 
-<file path=ppt/slides/slide2.xml><?xml version="1.0" encoding="utf-8"?>
-<p:sld xmlns:a="http://schemas.openxmlformats.org/drawingml/2006/main" xmlns:r="http://schemas.openxmlformats.org/officeDocument/2006/relationships" xmlns:p="http://schemas.openxmlformats.org/presentationml/2006/main">
-  <p:cSld>
-    <p:spTree>
-      <p:nvGrpSpPr>
-        <p:cNvPr id="1" name=""/>
-        <p:cNvGrpSpPr/>
-        <p:nvPr/>
-      </p:nvGrpSpPr>
-      <p:grpSpPr>
-        <a:xfrm>
-          <a:off x="0" y="0"/>
-          <a:ext cx="0" cy="0"/>
-          <a:chOff x="0" y="0"/>
-          <a:chExt cx="0" cy="0"/>
-        </a:xfrm>
-      </p:grpSpPr>
-      <p:sp>
-        <p:nvSpPr>
-          <p:cNvPr id="2" name="Title 1"/>
-          <p:cNvSpPr>
-            <a:spLocks noGrp="1"/>
-          </p:cNvSpPr>
-          <p:nvPr>
-            <p:ph type="title"/>
-          </p:nvPr>
-        </p:nvSpPr>
-        <p:spPr>
-          <a:xfrm>
-            <a:off x="638696" y="681008"/>
-            <a:ext cx="10425544" cy="906723"/>
-          </a:xfrm>
-        </p:spPr>
-        <p:txBody>
-          <a:bodyPr>
-            <a:normAutofit fontScale="90000"/>
-          </a:bodyPr>
-          <a:lstStyle/>
-          <a:p>
-            <a:pPr algn="ctr"/>
-            <a:r>
-              <a:rPr lang="en-US" dirty="0" smtClean="0"/>
-              <a:t>Basic scatter plot of telson length vs. wet weight</a:t>
-            </a:r>
-            <a:endParaRPr lang="en-US" dirty="0"/>
-          </a:p>
-        </p:txBody>
-      </p:sp>
-      <p:pic>
-        <p:nvPicPr>
-          <p:cNvPr id="6" name="Content Placeholder 5"/>
-          <p:cNvPicPr>
-            <a:picLocks noGrp="1" noChangeAspect="1"/>
-          </p:cNvPicPr>
-          <p:nvPr>
-            <p:ph idx="1"/>
-          </p:nvPr>
-        </p:nvPicPr>
-        <p:blipFill>
-          <a:blip r:embed="rId2"/>
-          <a:stretch>
-            <a:fillRect/>
-          </a:stretch>
-        </p:blipFill>
-        <p:spPr>
-          <a:xfrm>
-            <a:off x="1984294" y="1720137"/>
-            <a:ext cx="7734348" cy="4773198"/>
-          </a:xfrm>
-          <a:prstGeom prst="rect">
-            <a:avLst/>
-          </a:prstGeom>
-        </p:spPr>
-      </p:pic>
-    </p:spTree>
-    <p:extLst>
-      <p:ext uri="{BB962C8B-B14F-4D97-AF65-F5344CB8AC3E}">
-        <p14:creationId xmlns:p14="http://schemas.microsoft.com/office/powerpoint/2010/main" val="1974424397"/>
-      </p:ext>
-    </p:extLst>
-  </p:cSld>
-  <p:clrMapOvr>
-    <a:masterClrMapping/>
-  </p:clrMapOvr>
-</p:sld>
-</file>
-
 <file path=ppt/slides/slide3.xml><?xml version="1.0" encoding="utf-8"?>
 <p:sld xmlns:a="http://schemas.openxmlformats.org/drawingml/2006/main" xmlns:r="http://schemas.openxmlformats.org/officeDocument/2006/relationships" xmlns:p="http://schemas.openxmlformats.org/presentationml/2006/main">
   <p:cSld>
@@ -3543,7 +4477,7 @@
         </p:nvSpPr>
         <p:spPr>
           <a:xfrm>
-            <a:off x="838200" y="209008"/>
+            <a:off x="269488" y="75405"/>
             <a:ext cx="10515600" cy="1325563"/>
           </a:xfrm>
         </p:spPr>
@@ -3552,12 +4486,8 @@
           <a:lstStyle/>
           <a:p>
             <a:r>
-              <a:rPr lang="en-US" dirty="0" err="1" smtClean="0"/>
-              <a:t>ggplot</a:t>
-            </a:r>
-            <a:r>
               <a:rPr lang="en-US" dirty="0" smtClean="0"/>
-              <a:t> scatter + treatment </a:t>
+              <a:t>Linear models for length ~ weight + creating body condition </a:t>
             </a:r>
             <a:endParaRPr lang="en-US" dirty="0"/>
           </a:p>
@@ -3565,7 +4495,7 @@
       </p:sp>
       <p:pic>
         <p:nvPicPr>
-          <p:cNvPr id="8" name="Content Placeholder 7"/>
+          <p:cNvPr id="4" name="Content Placeholder 3"/>
           <p:cNvPicPr>
             <a:picLocks noGrp="1" noChangeAspect="1"/>
           </p:cNvPicPr>
@@ -3581,8 +4511,8 @@
         </p:blipFill>
         <p:spPr>
           <a:xfrm>
-            <a:off x="2273431" y="1842100"/>
-            <a:ext cx="7645138" cy="4718142"/>
+            <a:off x="3305291" y="1400968"/>
+            <a:ext cx="5581418" cy="5210867"/>
           </a:xfrm>
           <a:prstGeom prst="rect">
             <a:avLst/>
@@ -3592,7 +4522,7 @@
     </p:spTree>
     <p:extLst>
       <p:ext uri="{BB962C8B-B14F-4D97-AF65-F5344CB8AC3E}">
-        <p14:creationId xmlns:p14="http://schemas.microsoft.com/office/powerpoint/2010/main" val="1450444940"/>
+        <p14:creationId xmlns:p14="http://schemas.microsoft.com/office/powerpoint/2010/main" val="2197572552"/>
       </p:ext>
     </p:extLst>
   </p:cSld>
@@ -3629,14 +4559,23 @@
             <p:ph type="title"/>
           </p:nvPr>
         </p:nvSpPr>
-        <p:spPr/>
-        <p:txBody>
-          <a:bodyPr/>
-          <a:lstStyle/>
-          <a:p>
+        <p:spPr>
+          <a:xfrm>
+            <a:off x="838200" y="209008"/>
+            <a:ext cx="10515600" cy="1325563"/>
+          </a:xfrm>
+        </p:spPr>
+        <p:txBody>
+          <a:bodyPr/>
+          <a:lstStyle/>
+          <a:p>
+            <a:r>
+              <a:rPr lang="en-US" dirty="0" err="1" smtClean="0"/>
+              <a:t>ggplot</a:t>
+            </a:r>
             <a:r>
               <a:rPr lang="en-US" dirty="0" smtClean="0"/>
-              <a:t>Faceted by treatment</a:t>
+              <a:t> scatter + treatment </a:t>
             </a:r>
             <a:endParaRPr lang="en-US" dirty="0"/>
           </a:p>
@@ -3644,7 +4583,7 @@
       </p:sp>
       <p:pic>
         <p:nvPicPr>
-          <p:cNvPr id="4" name="Content Placeholder 3"/>
+          <p:cNvPr id="6" name="Content Placeholder 5"/>
           <p:cNvPicPr>
             <a:picLocks noGrp="1" noChangeAspect="1"/>
           </p:cNvPicPr>
@@ -3660,8 +4599,8 @@
         </p:blipFill>
         <p:spPr>
           <a:xfrm>
-            <a:off x="2329187" y="2000128"/>
-            <a:ext cx="7533626" cy="4649324"/>
+            <a:off x="2259425" y="1534571"/>
+            <a:ext cx="7673149" cy="4735429"/>
           </a:xfrm>
           <a:prstGeom prst="rect">
             <a:avLst/>
@@ -3671,7 +4610,7 @@
     </p:spTree>
     <p:extLst>
       <p:ext uri="{BB962C8B-B14F-4D97-AF65-F5344CB8AC3E}">
-        <p14:creationId xmlns:p14="http://schemas.microsoft.com/office/powerpoint/2010/main" val="1568931333"/>
+        <p14:creationId xmlns:p14="http://schemas.microsoft.com/office/powerpoint/2010/main" val="1450444940"/>
       </p:ext>
     </p:extLst>
   </p:cSld>
@@ -3715,7 +4654,7 @@
           <a:p>
             <a:r>
               <a:rPr lang="en-US" dirty="0" smtClean="0"/>
-              <a:t>Faceted by MOATS</a:t>
+              <a:t>Faceted by treatment</a:t>
             </a:r>
             <a:endParaRPr lang="en-US" dirty="0"/>
           </a:p>
@@ -3723,7 +4662,7 @@
       </p:sp>
       <p:pic>
         <p:nvPicPr>
-          <p:cNvPr id="4" name="Content Placeholder 3"/>
+          <p:cNvPr id="7" name="Content Placeholder 6"/>
           <p:cNvPicPr>
             <a:picLocks noGrp="1" noChangeAspect="1"/>
           </p:cNvPicPr>
@@ -3739,8 +4678,8 @@
         </p:blipFill>
         <p:spPr>
           <a:xfrm>
-            <a:off x="2259425" y="1921847"/>
-            <a:ext cx="7673149" cy="4735429"/>
+            <a:off x="2156343" y="1609614"/>
+            <a:ext cx="7879313" cy="4862662"/>
           </a:xfrm>
           <a:prstGeom prst="rect">
             <a:avLst/>
@@ -3750,7 +4689,7 @@
     </p:spTree>
     <p:extLst>
       <p:ext uri="{BB962C8B-B14F-4D97-AF65-F5344CB8AC3E}">
-        <p14:creationId xmlns:p14="http://schemas.microsoft.com/office/powerpoint/2010/main" val="1227977771"/>
+        <p14:creationId xmlns:p14="http://schemas.microsoft.com/office/powerpoint/2010/main" val="1568931333"/>
       </p:ext>
     </p:extLst>
   </p:cSld>
@@ -3794,7 +4733,7 @@
           <a:p>
             <a:r>
               <a:rPr lang="en-US" dirty="0" smtClean="0"/>
-              <a:t>Boxplot by treatment</a:t>
+              <a:t>Faceted by MOATS</a:t>
             </a:r>
             <a:endParaRPr lang="en-US" dirty="0"/>
           </a:p>
@@ -3802,11 +4741,13 @@
       </p:sp>
       <p:pic>
         <p:nvPicPr>
-          <p:cNvPr id="5" name="Picture 4"/>
+          <p:cNvPr id="7" name="Content Placeholder 6"/>
           <p:cNvPicPr>
-            <a:picLocks noChangeAspect="1"/>
+            <a:picLocks noGrp="1" noChangeAspect="1"/>
           </p:cNvPicPr>
-          <p:nvPr/>
+          <p:nvPr>
+            <p:ph idx="1"/>
+          </p:nvPr>
         </p:nvPicPr>
         <p:blipFill>
           <a:blip r:embed="rId2"/>
@@ -3816,8 +4757,8 @@
         </p:blipFill>
         <p:spPr>
           <a:xfrm>
-            <a:off x="2175212" y="1516823"/>
-            <a:ext cx="7841575" cy="4839372"/>
+            <a:off x="2267855" y="1567589"/>
+            <a:ext cx="7656289" cy="4725024"/>
           </a:xfrm>
           <a:prstGeom prst="rect">
             <a:avLst/>
@@ -3827,7 +4768,7 @@
     </p:spTree>
     <p:extLst>
       <p:ext uri="{BB962C8B-B14F-4D97-AF65-F5344CB8AC3E}">
-        <p14:creationId xmlns:p14="http://schemas.microsoft.com/office/powerpoint/2010/main" val="369326488"/>
+        <p14:creationId xmlns:p14="http://schemas.microsoft.com/office/powerpoint/2010/main" val="1227977771"/>
       </p:ext>
     </p:extLst>
   </p:cSld>
@@ -3871,7 +4812,7 @@
           <a:p>
             <a:r>
               <a:rPr lang="en-US" dirty="0" smtClean="0"/>
-              <a:t>Boxplot by treatment + points</a:t>
+              <a:t>Boxplot by treatment</a:t>
             </a:r>
             <a:endParaRPr lang="en-US" dirty="0"/>
           </a:p>
@@ -3879,13 +4820,11 @@
       </p:sp>
       <p:pic>
         <p:nvPicPr>
-          <p:cNvPr id="6" name="Content Placeholder 5"/>
+          <p:cNvPr id="4" name="Picture 3"/>
           <p:cNvPicPr>
-            <a:picLocks noGrp="1" noChangeAspect="1"/>
+            <a:picLocks noChangeAspect="1"/>
           </p:cNvPicPr>
-          <p:nvPr>
-            <p:ph idx="1"/>
-          </p:nvPr>
+          <p:nvPr/>
         </p:nvPicPr>
         <p:blipFill>
           <a:blip r:embed="rId2"/>
@@ -3895,8 +4834,8 @@
         </p:blipFill>
         <p:spPr>
           <a:xfrm>
-            <a:off x="2196183" y="1690688"/>
-            <a:ext cx="7799633" cy="4813488"/>
+            <a:off x="2351489" y="1690688"/>
+            <a:ext cx="7489021" cy="4621796"/>
           </a:xfrm>
           <a:prstGeom prst="rect">
             <a:avLst/>
@@ -3906,7 +4845,7 @@
     </p:spTree>
     <p:extLst>
       <p:ext uri="{BB962C8B-B14F-4D97-AF65-F5344CB8AC3E}">
-        <p14:creationId xmlns:p14="http://schemas.microsoft.com/office/powerpoint/2010/main" val="3927715870"/>
+        <p14:creationId xmlns:p14="http://schemas.microsoft.com/office/powerpoint/2010/main" val="369326488"/>
       </p:ext>
     </p:extLst>
   </p:cSld>
@@ -3950,7 +4889,7 @@
           <a:p>
             <a:r>
               <a:rPr lang="en-US" dirty="0" smtClean="0"/>
-              <a:t>Basic stats</a:t>
+              <a:t>Boxplot by treatment + points</a:t>
             </a:r>
             <a:endParaRPr lang="en-US" dirty="0"/>
           </a:p>
@@ -3958,7 +4897,7 @@
       </p:sp>
       <p:pic>
         <p:nvPicPr>
-          <p:cNvPr id="4" name="Content Placeholder 3"/>
+          <p:cNvPr id="7" name="Content Placeholder 6"/>
           <p:cNvPicPr>
             <a:picLocks noGrp="1" noChangeAspect="1"/>
           </p:cNvPicPr>
@@ -3974,8 +4913,8 @@
         </p:blipFill>
         <p:spPr>
           <a:xfrm>
-            <a:off x="419100" y="3387923"/>
-            <a:ext cx="11353800" cy="1422712"/>
+            <a:off x="2407245" y="1817694"/>
+            <a:ext cx="7377509" cy="4552977"/>
           </a:xfrm>
           <a:prstGeom prst="rect">
             <a:avLst/>
@@ -3985,7 +4924,7 @@
     </p:spTree>
     <p:extLst>
       <p:ext uri="{BB962C8B-B14F-4D97-AF65-F5344CB8AC3E}">
-        <p14:creationId xmlns:p14="http://schemas.microsoft.com/office/powerpoint/2010/main" val="3803969312"/>
+        <p14:creationId xmlns:p14="http://schemas.microsoft.com/office/powerpoint/2010/main" val="3927715870"/>
       </p:ext>
     </p:extLst>
   </p:cSld>
@@ -4022,19 +4961,14 @@
             <p:ph type="title"/>
           </p:nvPr>
         </p:nvSpPr>
-        <p:spPr>
-          <a:xfrm>
-            <a:off x="838200" y="365126"/>
-            <a:ext cx="10123449" cy="883812"/>
-          </a:xfrm>
-        </p:spPr>
+        <p:spPr/>
         <p:txBody>
           <a:bodyPr/>
           <a:lstStyle/>
           <a:p>
             <a:r>
               <a:rPr lang="en-US" dirty="0" smtClean="0"/>
-              <a:t>Treatment comparison of TL</a:t>
+              <a:t>Length at treatment</a:t>
             </a:r>
             <a:endParaRPr lang="en-US" dirty="0"/>
           </a:p>
@@ -4042,7 +4976,7 @@
       </p:sp>
       <p:pic>
         <p:nvPicPr>
-          <p:cNvPr id="4" name="Content Placeholder 3"/>
+          <p:cNvPr id="6" name="Content Placeholder 5"/>
           <p:cNvPicPr>
             <a:picLocks noGrp="1" noChangeAspect="1"/>
           </p:cNvPicPr>
@@ -4058,8 +4992,8 @@
         </p:blipFill>
         <p:spPr>
           <a:xfrm>
-            <a:off x="2251128" y="1870328"/>
-            <a:ext cx="7689743" cy="4745670"/>
+            <a:off x="2273431" y="1866092"/>
+            <a:ext cx="7645138" cy="4718142"/>
           </a:xfrm>
           <a:prstGeom prst="rect">
             <a:avLst/>
@@ -4069,7 +5003,7 @@
     </p:spTree>
     <p:extLst>
       <p:ext uri="{BB962C8B-B14F-4D97-AF65-F5344CB8AC3E}">
-        <p14:creationId xmlns:p14="http://schemas.microsoft.com/office/powerpoint/2010/main" val="242548804"/>
+        <p14:creationId xmlns:p14="http://schemas.microsoft.com/office/powerpoint/2010/main" val="3312429944"/>
       </p:ext>
     </p:extLst>
   </p:cSld>

</xml_diff>

<commit_message>
Updated plots in PP
</commit_message>
<xml_diff>
--- a/Krill size plots.pptx
+++ b/Krill size plots.pptx
@@ -30,6 +30,7 @@
     <p:sldId id="281" r:id="rId24"/>
     <p:sldId id="269" r:id="rId25"/>
     <p:sldId id="270" r:id="rId26"/>
+    <p:sldId id="282" r:id="rId27"/>
   </p:sldIdLst>
   <p:sldSz cx="12192000" cy="6858000"/>
   <p:notesSz cx="6858000" cy="9144000"/>
@@ -3424,7 +3425,7 @@
           <a:graphicData uri="http://schemas.openxmlformats.org/presentationml/2006/ole">
             <mc:AlternateContent xmlns:mc="http://schemas.openxmlformats.org/markup-compatibility/2006">
               <mc:Choice xmlns:v="urn:schemas-microsoft-com:vml" Requires="v">
-                <p:oleObj spid="_x0000_s2054" name="Worksheet" r:id="rId3" imgW="10496378" imgH="771525" progId="Excel.Sheet.12">
+                <p:oleObj spid="_x0000_s2055" name="Worksheet" r:id="rId3" imgW="10496378" imgH="771525" progId="Excel.Sheet.12">
                   <p:embed/>
                 </p:oleObj>
               </mc:Choice>
@@ -4240,12 +4241,8 @@
           <a:lstStyle/>
           <a:p>
             <a:r>
-              <a:rPr lang="en-US" smtClean="0"/>
-              <a:t>Body condition </a:t>
-            </a:r>
-            <a:r>
               <a:rPr lang="en-US" dirty="0" smtClean="0"/>
-              <a:t>comparison by MOATS</a:t>
+              <a:t>Body condition comparison by MOATS</a:t>
             </a:r>
             <a:endParaRPr lang="en-US" dirty="0"/>
           </a:p>
@@ -4332,7 +4329,7 @@
       </p:sp>
       <p:pic>
         <p:nvPicPr>
-          <p:cNvPr id="4" name="Content Placeholder 3"/>
+          <p:cNvPr id="5" name="Content Placeholder 4"/>
           <p:cNvPicPr>
             <a:picLocks noGrp="1" noChangeAspect="1"/>
           </p:cNvPicPr>
@@ -4348,8 +4345,8 @@
         </p:blipFill>
         <p:spPr>
           <a:xfrm>
-            <a:off x="1916338" y="1875012"/>
-            <a:ext cx="7718316" cy="4628726"/>
+            <a:off x="2162001" y="1493003"/>
+            <a:ext cx="7867998" cy="4699389"/>
           </a:xfrm>
           <a:prstGeom prst="rect">
             <a:avLst/>
@@ -4411,7 +4408,7 @@
       </p:sp>
       <p:pic>
         <p:nvPicPr>
-          <p:cNvPr id="4" name="Content Placeholder 3"/>
+          <p:cNvPr id="5" name="Content Placeholder 4"/>
           <p:cNvPicPr>
             <a:picLocks noGrp="1" noChangeAspect="1"/>
           </p:cNvPicPr>
@@ -4427,8 +4424,8 @@
         </p:blipFill>
         <p:spPr>
           <a:xfrm>
-            <a:off x="2657388" y="1773044"/>
-            <a:ext cx="7524993" cy="4884235"/>
+            <a:off x="1935027" y="1571199"/>
+            <a:ext cx="8321946" cy="4887313"/>
           </a:xfrm>
           <a:prstGeom prst="rect">
             <a:avLst/>
@@ -4439,6 +4436,89 @@
     <p:extLst>
       <p:ext uri="{BB962C8B-B14F-4D97-AF65-F5344CB8AC3E}">
         <p14:creationId xmlns:p14="http://schemas.microsoft.com/office/powerpoint/2010/main" val="451297770"/>
+      </p:ext>
+    </p:extLst>
+  </p:cSld>
+  <p:clrMapOvr>
+    <a:masterClrMapping/>
+  </p:clrMapOvr>
+</p:sld>
+</file>
+
+<file path=ppt/slides/slide26.xml><?xml version="1.0" encoding="utf-8"?>
+<p:sld xmlns:a="http://schemas.openxmlformats.org/drawingml/2006/main" xmlns:r="http://schemas.openxmlformats.org/officeDocument/2006/relationships" xmlns:p="http://schemas.openxmlformats.org/presentationml/2006/main">
+  <p:cSld>
+    <p:spTree>
+      <p:nvGrpSpPr>
+        <p:cNvPr id="1" name=""/>
+        <p:cNvGrpSpPr/>
+        <p:nvPr/>
+      </p:nvGrpSpPr>
+      <p:grpSpPr>
+        <a:xfrm>
+          <a:off x="0" y="0"/>
+          <a:ext cx="0" cy="0"/>
+          <a:chOff x="0" y="0"/>
+          <a:chExt cx="0" cy="0"/>
+        </a:xfrm>
+      </p:grpSpPr>
+      <p:sp>
+        <p:nvSpPr>
+          <p:cNvPr id="2" name="Title 1"/>
+          <p:cNvSpPr>
+            <a:spLocks noGrp="1"/>
+          </p:cNvSpPr>
+          <p:nvPr>
+            <p:ph type="title"/>
+          </p:nvPr>
+        </p:nvSpPr>
+        <p:spPr/>
+        <p:txBody>
+          <a:bodyPr/>
+          <a:lstStyle/>
+          <a:p>
+            <a:r>
+              <a:rPr lang="en-US" dirty="0"/>
+              <a:t>Linear mixed model for </a:t>
+            </a:r>
+            <a:r>
+              <a:rPr lang="en-US" dirty="0" smtClean="0"/>
+              <a:t>body condition</a:t>
+            </a:r>
+            <a:endParaRPr lang="en-US" dirty="0"/>
+          </a:p>
+        </p:txBody>
+      </p:sp>
+      <p:pic>
+        <p:nvPicPr>
+          <p:cNvPr id="4" name="Content Placeholder 3"/>
+          <p:cNvPicPr>
+            <a:picLocks noGrp="1" noChangeAspect="1"/>
+          </p:cNvPicPr>
+          <p:nvPr>
+            <p:ph idx="1"/>
+          </p:nvPr>
+        </p:nvPicPr>
+        <p:blipFill>
+          <a:blip r:embed="rId2"/>
+          <a:stretch>
+            <a:fillRect/>
+          </a:stretch>
+        </p:blipFill>
+        <p:spPr>
+          <a:xfrm>
+            <a:off x="1969010" y="1550020"/>
+            <a:ext cx="8253980" cy="4575814"/>
+          </a:xfrm>
+          <a:prstGeom prst="rect">
+            <a:avLst/>
+          </a:prstGeom>
+        </p:spPr>
+      </p:pic>
+    </p:spTree>
+    <p:extLst>
+      <p:ext uri="{BB962C8B-B14F-4D97-AF65-F5344CB8AC3E}">
+        <p14:creationId xmlns:p14="http://schemas.microsoft.com/office/powerpoint/2010/main" val="3723987516"/>
       </p:ext>
     </p:extLst>
   </p:cSld>

</xml_diff>

<commit_message>
Fully updated Fulton's K stats
</commit_message>
<xml_diff>
--- a/Krill size plots.pptx
+++ b/Krill size plots.pptx
@@ -8,29 +8,39 @@
     <p:sldId id="256" r:id="rId2"/>
     <p:sldId id="257" r:id="rId3"/>
     <p:sldId id="273" r:id="rId4"/>
-    <p:sldId id="258" r:id="rId5"/>
-    <p:sldId id="260" r:id="rId6"/>
-    <p:sldId id="261" r:id="rId7"/>
-    <p:sldId id="262" r:id="rId8"/>
-    <p:sldId id="263" r:id="rId9"/>
-    <p:sldId id="272" r:id="rId10"/>
-    <p:sldId id="271" r:id="rId11"/>
-    <p:sldId id="274" r:id="rId12"/>
-    <p:sldId id="275" r:id="rId13"/>
-    <p:sldId id="276" r:id="rId14"/>
-    <p:sldId id="264" r:id="rId15"/>
-    <p:sldId id="277" r:id="rId16"/>
-    <p:sldId id="278" r:id="rId17"/>
-    <p:sldId id="279" r:id="rId18"/>
-    <p:sldId id="265" r:id="rId19"/>
-    <p:sldId id="266" r:id="rId20"/>
-    <p:sldId id="267" r:id="rId21"/>
-    <p:sldId id="268" r:id="rId22"/>
-    <p:sldId id="280" r:id="rId23"/>
-    <p:sldId id="281" r:id="rId24"/>
-    <p:sldId id="269" r:id="rId25"/>
-    <p:sldId id="270" r:id="rId26"/>
-    <p:sldId id="282" r:id="rId27"/>
+    <p:sldId id="283" r:id="rId5"/>
+    <p:sldId id="258" r:id="rId6"/>
+    <p:sldId id="260" r:id="rId7"/>
+    <p:sldId id="261" r:id="rId8"/>
+    <p:sldId id="262" r:id="rId9"/>
+    <p:sldId id="263" r:id="rId10"/>
+    <p:sldId id="272" r:id="rId11"/>
+    <p:sldId id="271" r:id="rId12"/>
+    <p:sldId id="274" r:id="rId13"/>
+    <p:sldId id="275" r:id="rId14"/>
+    <p:sldId id="276" r:id="rId15"/>
+    <p:sldId id="287" r:id="rId16"/>
+    <p:sldId id="284" r:id="rId17"/>
+    <p:sldId id="285" r:id="rId18"/>
+    <p:sldId id="286" r:id="rId19"/>
+    <p:sldId id="264" r:id="rId20"/>
+    <p:sldId id="277" r:id="rId21"/>
+    <p:sldId id="278" r:id="rId22"/>
+    <p:sldId id="279" r:id="rId23"/>
+    <p:sldId id="288" r:id="rId24"/>
+    <p:sldId id="289" r:id="rId25"/>
+    <p:sldId id="265" r:id="rId26"/>
+    <p:sldId id="266" r:id="rId27"/>
+    <p:sldId id="267" r:id="rId28"/>
+    <p:sldId id="268" r:id="rId29"/>
+    <p:sldId id="280" r:id="rId30"/>
+    <p:sldId id="281" r:id="rId31"/>
+    <p:sldId id="290" r:id="rId32"/>
+    <p:sldId id="291" r:id="rId33"/>
+    <p:sldId id="269" r:id="rId34"/>
+    <p:sldId id="270" r:id="rId35"/>
+    <p:sldId id="282" r:id="rId36"/>
+    <p:sldId id="292" r:id="rId37"/>
   </p:sldIdLst>
   <p:sldSz cx="12192000" cy="6858000"/>
   <p:notesSz cx="6858000" cy="9144000"/>
@@ -268,7 +278,7 @@
           <a:p>
             <a:fld id="{413859D0-E984-4ECA-9756-CA5763017495}" type="datetimeFigureOut">
               <a:rPr lang="en-US" smtClean="0"/>
-              <a:t>10/9/2020</a:t>
+              <a:t>11/3/2020</a:t>
             </a:fld>
             <a:endParaRPr lang="en-US"/>
           </a:p>
@@ -438,7 +448,7 @@
           <a:p>
             <a:fld id="{413859D0-E984-4ECA-9756-CA5763017495}" type="datetimeFigureOut">
               <a:rPr lang="en-US" smtClean="0"/>
-              <a:t>10/9/2020</a:t>
+              <a:t>11/3/2020</a:t>
             </a:fld>
             <a:endParaRPr lang="en-US"/>
           </a:p>
@@ -618,7 +628,7 @@
           <a:p>
             <a:fld id="{413859D0-E984-4ECA-9756-CA5763017495}" type="datetimeFigureOut">
               <a:rPr lang="en-US" smtClean="0"/>
-              <a:t>10/9/2020</a:t>
+              <a:t>11/3/2020</a:t>
             </a:fld>
             <a:endParaRPr lang="en-US"/>
           </a:p>
@@ -788,7 +798,7 @@
           <a:p>
             <a:fld id="{413859D0-E984-4ECA-9756-CA5763017495}" type="datetimeFigureOut">
               <a:rPr lang="en-US" smtClean="0"/>
-              <a:t>10/9/2020</a:t>
+              <a:t>11/3/2020</a:t>
             </a:fld>
             <a:endParaRPr lang="en-US"/>
           </a:p>
@@ -1034,7 +1044,7 @@
           <a:p>
             <a:fld id="{413859D0-E984-4ECA-9756-CA5763017495}" type="datetimeFigureOut">
               <a:rPr lang="en-US" smtClean="0"/>
-              <a:t>10/9/2020</a:t>
+              <a:t>11/3/2020</a:t>
             </a:fld>
             <a:endParaRPr lang="en-US"/>
           </a:p>
@@ -1266,7 +1276,7 @@
           <a:p>
             <a:fld id="{413859D0-E984-4ECA-9756-CA5763017495}" type="datetimeFigureOut">
               <a:rPr lang="en-US" smtClean="0"/>
-              <a:t>10/9/2020</a:t>
+              <a:t>11/3/2020</a:t>
             </a:fld>
             <a:endParaRPr lang="en-US"/>
           </a:p>
@@ -1633,7 +1643,7 @@
           <a:p>
             <a:fld id="{413859D0-E984-4ECA-9756-CA5763017495}" type="datetimeFigureOut">
               <a:rPr lang="en-US" smtClean="0"/>
-              <a:t>10/9/2020</a:t>
+              <a:t>11/3/2020</a:t>
             </a:fld>
             <a:endParaRPr lang="en-US"/>
           </a:p>
@@ -1751,7 +1761,7 @@
           <a:p>
             <a:fld id="{413859D0-E984-4ECA-9756-CA5763017495}" type="datetimeFigureOut">
               <a:rPr lang="en-US" smtClean="0"/>
-              <a:t>10/9/2020</a:t>
+              <a:t>11/3/2020</a:t>
             </a:fld>
             <a:endParaRPr lang="en-US"/>
           </a:p>
@@ -1846,7 +1856,7 @@
           <a:p>
             <a:fld id="{413859D0-E984-4ECA-9756-CA5763017495}" type="datetimeFigureOut">
               <a:rPr lang="en-US" smtClean="0"/>
-              <a:t>10/9/2020</a:t>
+              <a:t>11/3/2020</a:t>
             </a:fld>
             <a:endParaRPr lang="en-US"/>
           </a:p>
@@ -2123,7 +2133,7 @@
           <a:p>
             <a:fld id="{413859D0-E984-4ECA-9756-CA5763017495}" type="datetimeFigureOut">
               <a:rPr lang="en-US" smtClean="0"/>
-              <a:t>10/9/2020</a:t>
+              <a:t>11/3/2020</a:t>
             </a:fld>
             <a:endParaRPr lang="en-US"/>
           </a:p>
@@ -2376,7 +2386,7 @@
           <a:p>
             <a:fld id="{413859D0-E984-4ECA-9756-CA5763017495}" type="datetimeFigureOut">
               <a:rPr lang="en-US" smtClean="0"/>
-              <a:t>10/9/2020</a:t>
+              <a:t>11/3/2020</a:t>
             </a:fld>
             <a:endParaRPr lang="en-US"/>
           </a:p>
@@ -2589,7 +2599,7 @@
           <a:p>
             <a:fld id="{413859D0-E984-4ECA-9756-CA5763017495}" type="datetimeFigureOut">
               <a:rPr lang="en-US" smtClean="0"/>
-              <a:t>10/9/2020</a:t>
+              <a:t>11/3/2020</a:t>
             </a:fld>
             <a:endParaRPr lang="en-US"/>
           </a:p>
@@ -3083,7 +3093,7 @@
           <a:p>
             <a:r>
               <a:rPr lang="en-US" dirty="0" smtClean="0"/>
-              <a:t>Weight at treatment</a:t>
+              <a:t>Length at treatment</a:t>
             </a:r>
             <a:endParaRPr lang="en-US" dirty="0"/>
           </a:p>
@@ -3091,11 +3101,13 @@
       </p:sp>
       <p:pic>
         <p:nvPicPr>
-          <p:cNvPr id="5" name="Picture 4"/>
+          <p:cNvPr id="6" name="Content Placeholder 5"/>
           <p:cNvPicPr>
-            <a:picLocks noChangeAspect="1"/>
+            <a:picLocks noGrp="1" noChangeAspect="1"/>
           </p:cNvPicPr>
-          <p:nvPr/>
+          <p:nvPr>
+            <p:ph idx="1"/>
+          </p:nvPr>
         </p:nvPicPr>
         <p:blipFill>
           <a:blip r:embed="rId2"/>
@@ -3105,8 +3117,8 @@
         </p:blipFill>
         <p:spPr>
           <a:xfrm>
-            <a:off x="2220385" y="1690688"/>
-            <a:ext cx="7751229" cy="4783616"/>
+            <a:off x="2273431" y="1866092"/>
+            <a:ext cx="7645138" cy="4718142"/>
           </a:xfrm>
           <a:prstGeom prst="rect">
             <a:avLst/>
@@ -3116,7 +3128,7 @@
     </p:spTree>
     <p:extLst>
       <p:ext uri="{BB962C8B-B14F-4D97-AF65-F5344CB8AC3E}">
-        <p14:creationId xmlns:p14="http://schemas.microsoft.com/office/powerpoint/2010/main" val="551857268"/>
+        <p14:creationId xmlns:p14="http://schemas.microsoft.com/office/powerpoint/2010/main" val="3312429944"/>
       </p:ext>
     </p:extLst>
   </p:cSld>
@@ -3160,7 +3172,7 @@
           <a:p>
             <a:r>
               <a:rPr lang="en-US" dirty="0" smtClean="0"/>
-              <a:t>Weight by length at treatment</a:t>
+              <a:t>Weight at treatment</a:t>
             </a:r>
             <a:endParaRPr lang="en-US" dirty="0"/>
           </a:p>
@@ -3168,13 +3180,11 @@
       </p:sp>
       <p:pic>
         <p:nvPicPr>
-          <p:cNvPr id="4" name="Content Placeholder 3"/>
+          <p:cNvPr id="5" name="Picture 4"/>
           <p:cNvPicPr>
-            <a:picLocks noGrp="1" noChangeAspect="1"/>
+            <a:picLocks noChangeAspect="1"/>
           </p:cNvPicPr>
-          <p:nvPr>
-            <p:ph idx="1"/>
-          </p:nvPr>
+          <p:nvPr/>
         </p:nvPicPr>
         <p:blipFill>
           <a:blip r:embed="rId2"/>
@@ -3184,8 +3194,8 @@
         </p:blipFill>
         <p:spPr>
           <a:xfrm>
-            <a:off x="1976244" y="1690688"/>
-            <a:ext cx="8239512" cy="5084956"/>
+            <a:off x="2220385" y="1690688"/>
+            <a:ext cx="7751229" cy="4783616"/>
           </a:xfrm>
           <a:prstGeom prst="rect">
             <a:avLst/>
@@ -3195,7 +3205,7 @@
     </p:spTree>
     <p:extLst>
       <p:ext uri="{BB962C8B-B14F-4D97-AF65-F5344CB8AC3E}">
-        <p14:creationId xmlns:p14="http://schemas.microsoft.com/office/powerpoint/2010/main" val="423664979"/>
+        <p14:creationId xmlns:p14="http://schemas.microsoft.com/office/powerpoint/2010/main" val="551857268"/>
       </p:ext>
     </p:extLst>
   </p:cSld>
@@ -3239,7 +3249,7 @@
           <a:p>
             <a:r>
               <a:rPr lang="en-US" dirty="0" smtClean="0"/>
-              <a:t>Krill body condition at treatment</a:t>
+              <a:t>Weight by length at treatment</a:t>
             </a:r>
             <a:endParaRPr lang="en-US" dirty="0"/>
           </a:p>
@@ -3263,8 +3273,8 @@
         </p:blipFill>
         <p:spPr>
           <a:xfrm>
-            <a:off x="1966772" y="1690688"/>
-            <a:ext cx="8258455" cy="5096647"/>
+            <a:off x="1976244" y="1690688"/>
+            <a:ext cx="8239512" cy="5084956"/>
           </a:xfrm>
           <a:prstGeom prst="rect">
             <a:avLst/>
@@ -3274,7 +3284,7 @@
     </p:spTree>
     <p:extLst>
       <p:ext uri="{BB962C8B-B14F-4D97-AF65-F5344CB8AC3E}">
-        <p14:creationId xmlns:p14="http://schemas.microsoft.com/office/powerpoint/2010/main" val="3126891838"/>
+        <p14:creationId xmlns:p14="http://schemas.microsoft.com/office/powerpoint/2010/main" val="423664979"/>
       </p:ext>
     </p:extLst>
   </p:cSld>
@@ -3318,7 +3328,7 @@
           <a:p>
             <a:r>
               <a:rPr lang="en-US" dirty="0" smtClean="0"/>
-              <a:t>Body condition at treatment by MOATS</a:t>
+              <a:t>Krill body condition at treatment</a:t>
             </a:r>
             <a:endParaRPr lang="en-US" dirty="0"/>
           </a:p>
@@ -3342,8 +3352,8 @@
         </p:blipFill>
         <p:spPr>
           <a:xfrm>
-            <a:off x="2156343" y="1690688"/>
-            <a:ext cx="7879313" cy="4862662"/>
+            <a:off x="1966772" y="1690688"/>
+            <a:ext cx="8258455" cy="5096647"/>
           </a:xfrm>
           <a:prstGeom prst="rect">
             <a:avLst/>
@@ -3353,7 +3363,7 @@
     </p:spTree>
     <p:extLst>
       <p:ext uri="{BB962C8B-B14F-4D97-AF65-F5344CB8AC3E}">
-        <p14:creationId xmlns:p14="http://schemas.microsoft.com/office/powerpoint/2010/main" val="270110278"/>
+        <p14:creationId xmlns:p14="http://schemas.microsoft.com/office/powerpoint/2010/main" val="3126891838"/>
       </p:ext>
     </p:extLst>
   </p:cSld>
@@ -3397,73 +3407,42 @@
           <a:p>
             <a:r>
               <a:rPr lang="en-US" dirty="0" smtClean="0"/>
-              <a:t>Basic stats</a:t>
+              <a:t>Body condition at treatment by MOATS</a:t>
             </a:r>
             <a:endParaRPr lang="en-US" dirty="0"/>
           </a:p>
         </p:txBody>
       </p:sp>
-      <p:graphicFrame>
-        <p:nvGraphicFramePr>
-          <p:cNvPr id="7" name="Object 6"/>
-          <p:cNvGraphicFramePr>
-            <a:graphicFrameLocks noChangeAspect="1"/>
-          </p:cNvGraphicFramePr>
-          <p:nvPr>
-            <p:extLst>
-              <p:ext uri="{D42A27DB-BD31-4B8C-83A1-F6EECF244321}">
-                <p14:modId xmlns:p14="http://schemas.microsoft.com/office/powerpoint/2010/main" val="3214993825"/>
-              </p:ext>
-            </p:extLst>
-          </p:nvPr>
-        </p:nvGraphicFramePr>
-        <p:xfrm>
-          <a:off x="55754" y="3110187"/>
-          <a:ext cx="12080491" cy="887949"/>
-        </p:xfrm>
-        <a:graphic>
-          <a:graphicData uri="http://schemas.openxmlformats.org/presentationml/2006/ole">
-            <mc:AlternateContent xmlns:mc="http://schemas.openxmlformats.org/markup-compatibility/2006">
-              <mc:Choice xmlns:v="urn:schemas-microsoft-com:vml" Requires="v">
-                <p:oleObj spid="_x0000_s2055" name="Worksheet" r:id="rId3" imgW="10496378" imgH="771525" progId="Excel.Sheet.12">
-                  <p:embed/>
-                </p:oleObj>
-              </mc:Choice>
-              <mc:Fallback>
-                <p:oleObj name="Worksheet" r:id="rId3" imgW="10496378" imgH="771525" progId="Excel.Sheet.12">
-                  <p:embed/>
-                  <p:pic>
-                    <p:nvPicPr>
-                      <p:cNvPr id="0" name=""/>
-                      <p:cNvPicPr/>
-                      <p:nvPr/>
-                    </p:nvPicPr>
-                    <p:blipFill>
-                      <a:blip r:embed="rId4"/>
-                      <a:stretch>
-                        <a:fillRect/>
-                      </a:stretch>
-                    </p:blipFill>
-                    <p:spPr>
-                      <a:xfrm>
-                        <a:off x="55754" y="3110187"/>
-                        <a:ext cx="12080491" cy="887949"/>
-                      </a:xfrm>
-                      <a:prstGeom prst="rect">
-                        <a:avLst/>
-                      </a:prstGeom>
-                    </p:spPr>
-                  </p:pic>
-                </p:oleObj>
-              </mc:Fallback>
-            </mc:AlternateContent>
-          </a:graphicData>
-        </a:graphic>
-      </p:graphicFrame>
+      <p:pic>
+        <p:nvPicPr>
+          <p:cNvPr id="4" name="Content Placeholder 3"/>
+          <p:cNvPicPr>
+            <a:picLocks noGrp="1" noChangeAspect="1"/>
+          </p:cNvPicPr>
+          <p:nvPr>
+            <p:ph idx="1"/>
+          </p:nvPr>
+        </p:nvPicPr>
+        <p:blipFill>
+          <a:blip r:embed="rId2"/>
+          <a:stretch>
+            <a:fillRect/>
+          </a:stretch>
+        </p:blipFill>
+        <p:spPr>
+          <a:xfrm>
+            <a:off x="2156343" y="1690688"/>
+            <a:ext cx="7879313" cy="4862662"/>
+          </a:xfrm>
+          <a:prstGeom prst="rect">
+            <a:avLst/>
+          </a:prstGeom>
+        </p:spPr>
+      </p:pic>
     </p:spTree>
     <p:extLst>
       <p:ext uri="{BB962C8B-B14F-4D97-AF65-F5344CB8AC3E}">
-        <p14:creationId xmlns:p14="http://schemas.microsoft.com/office/powerpoint/2010/main" val="3803969312"/>
+        <p14:creationId xmlns:p14="http://schemas.microsoft.com/office/powerpoint/2010/main" val="270110278"/>
       </p:ext>
     </p:extLst>
   </p:cSld>
@@ -3507,7 +3486,7 @@
           <a:p>
             <a:r>
               <a:rPr lang="en-US" dirty="0" smtClean="0"/>
-              <a:t>Correlation of telson length and wet weight</a:t>
+              <a:t>Fulton’s K at treatment</a:t>
             </a:r>
             <a:endParaRPr lang="en-US" dirty="0"/>
           </a:p>
@@ -3515,13 +3494,11 @@
       </p:sp>
       <p:pic>
         <p:nvPicPr>
-          <p:cNvPr id="4" name="Content Placeholder 3"/>
+          <p:cNvPr id="3" name="Picture 2"/>
           <p:cNvPicPr>
-            <a:picLocks noGrp="1" noChangeAspect="1"/>
+            <a:picLocks noChangeAspect="1"/>
           </p:cNvPicPr>
-          <p:nvPr>
-            <p:ph idx="1"/>
-          </p:nvPr>
+          <p:nvPr/>
         </p:nvPicPr>
         <p:blipFill>
           <a:blip r:embed="rId2"/>
@@ -3531,8 +3508,8 @@
         </p:blipFill>
         <p:spPr>
           <a:xfrm>
-            <a:off x="2262280" y="1690688"/>
-            <a:ext cx="7667440" cy="4731906"/>
+            <a:off x="1811195" y="1690688"/>
+            <a:ext cx="8268886" cy="5103084"/>
           </a:xfrm>
           <a:prstGeom prst="rect">
             <a:avLst/>
@@ -3542,7 +3519,7 @@
     </p:spTree>
     <p:extLst>
       <p:ext uri="{BB962C8B-B14F-4D97-AF65-F5344CB8AC3E}">
-        <p14:creationId xmlns:p14="http://schemas.microsoft.com/office/powerpoint/2010/main" val="3053374340"/>
+        <p14:creationId xmlns:p14="http://schemas.microsoft.com/office/powerpoint/2010/main" val="3898430435"/>
       </p:ext>
     </p:extLst>
   </p:cSld>
@@ -3586,7 +3563,7 @@
           <a:p>
             <a:r>
               <a:rPr lang="en-US" dirty="0" smtClean="0"/>
-              <a:t>LM of telson length fixed at treatment</a:t>
+              <a:t>K at treatment, removing larger outliers</a:t>
             </a:r>
             <a:endParaRPr lang="en-US" dirty="0"/>
           </a:p>
@@ -3594,13 +3571,11 @@
       </p:sp>
       <p:pic>
         <p:nvPicPr>
-          <p:cNvPr id="4" name="Content Placeholder 3"/>
+          <p:cNvPr id="3" name="Picture 2"/>
           <p:cNvPicPr>
-            <a:picLocks noGrp="1" noChangeAspect="1"/>
+            <a:picLocks noChangeAspect="1"/>
           </p:cNvPicPr>
-          <p:nvPr>
-            <p:ph idx="1"/>
-          </p:nvPr>
+          <p:nvPr/>
         </p:nvPicPr>
         <p:blipFill>
           <a:blip r:embed="rId2"/>
@@ -3610,8 +3585,8 @@
         </p:blipFill>
         <p:spPr>
           <a:xfrm>
-            <a:off x="2620537" y="2129842"/>
-            <a:ext cx="6337958" cy="4414627"/>
+            <a:off x="2206612" y="1927911"/>
+            <a:ext cx="7588120" cy="4682954"/>
           </a:xfrm>
           <a:prstGeom prst="rect">
             <a:avLst/>
@@ -3621,7 +3596,7 @@
     </p:spTree>
     <p:extLst>
       <p:ext uri="{BB962C8B-B14F-4D97-AF65-F5344CB8AC3E}">
-        <p14:creationId xmlns:p14="http://schemas.microsoft.com/office/powerpoint/2010/main" val="1661914331"/>
+        <p14:creationId xmlns:p14="http://schemas.microsoft.com/office/powerpoint/2010/main" val="1976895227"/>
       </p:ext>
     </p:extLst>
   </p:cSld>
@@ -3664,29 +3639,20 @@
           <a:lstStyle/>
           <a:p>
             <a:r>
-              <a:rPr lang="en-US" dirty="0"/>
-              <a:t>LM of telson </a:t>
-            </a:r>
-            <a:r>
               <a:rPr lang="en-US" dirty="0" smtClean="0"/>
-              <a:t>weight </a:t>
-            </a:r>
-            <a:r>
-              <a:rPr lang="en-US" dirty="0"/>
-              <a:t>fixed at treatment</a:t>
-            </a:r>
+              <a:t>K at treatment, by MOATS</a:t>
+            </a:r>
+            <a:endParaRPr lang="en-US" dirty="0"/>
           </a:p>
         </p:txBody>
       </p:sp>
       <p:pic>
         <p:nvPicPr>
-          <p:cNvPr id="4" name="Content Placeholder 3"/>
+          <p:cNvPr id="4" name="Picture 3"/>
           <p:cNvPicPr>
-            <a:picLocks noGrp="1" noChangeAspect="1"/>
+            <a:picLocks noChangeAspect="1"/>
           </p:cNvPicPr>
-          <p:nvPr>
-            <p:ph idx="1"/>
-          </p:nvPr>
+          <p:nvPr/>
         </p:nvPicPr>
         <p:blipFill>
           <a:blip r:embed="rId2"/>
@@ -3696,8 +3662,8 @@
         </p:blipFill>
         <p:spPr>
           <a:xfrm>
-            <a:off x="3166307" y="1916713"/>
-            <a:ext cx="5859385" cy="4700750"/>
+            <a:off x="2206612" y="1495425"/>
+            <a:ext cx="8128727" cy="5016586"/>
           </a:xfrm>
           <a:prstGeom prst="rect">
             <a:avLst/>
@@ -3707,7 +3673,7 @@
     </p:spTree>
     <p:extLst>
       <p:ext uri="{BB962C8B-B14F-4D97-AF65-F5344CB8AC3E}">
-        <p14:creationId xmlns:p14="http://schemas.microsoft.com/office/powerpoint/2010/main" val="1864186638"/>
+        <p14:creationId xmlns:p14="http://schemas.microsoft.com/office/powerpoint/2010/main" val="795837106"/>
       </p:ext>
     </p:extLst>
   </p:cSld>
@@ -3744,19 +3710,14 @@
             <p:ph type="title"/>
           </p:nvPr>
         </p:nvSpPr>
-        <p:spPr>
-          <a:xfrm>
-            <a:off x="838200" y="365126"/>
-            <a:ext cx="10123449" cy="883812"/>
-          </a:xfrm>
-        </p:spPr>
+        <p:spPr/>
         <p:txBody>
           <a:bodyPr/>
           <a:lstStyle/>
           <a:p>
             <a:r>
               <a:rPr lang="en-US" dirty="0" smtClean="0"/>
-              <a:t>Treatment comparison of TL</a:t>
+              <a:t>Again, without the outliers</a:t>
             </a:r>
             <a:endParaRPr lang="en-US" dirty="0"/>
           </a:p>
@@ -3764,13 +3725,11 @@
       </p:sp>
       <p:pic>
         <p:nvPicPr>
-          <p:cNvPr id="5" name="Content Placeholder 4"/>
+          <p:cNvPr id="3" name="Picture 2"/>
           <p:cNvPicPr>
-            <a:picLocks noGrp="1" noChangeAspect="1"/>
+            <a:picLocks noChangeAspect="1"/>
           </p:cNvPicPr>
-          <p:nvPr>
-            <p:ph idx="1"/>
-          </p:nvPr>
+          <p:nvPr/>
         </p:nvPicPr>
         <p:blipFill>
           <a:blip r:embed="rId2"/>
@@ -3780,8 +3739,8 @@
         </p:blipFill>
         <p:spPr>
           <a:xfrm>
-            <a:off x="2077355" y="1542707"/>
-            <a:ext cx="7645138" cy="4718142"/>
+            <a:off x="2071681" y="1690688"/>
+            <a:ext cx="8048637" cy="4967159"/>
           </a:xfrm>
           <a:prstGeom prst="rect">
             <a:avLst/>
@@ -3791,7 +3750,7 @@
     </p:spTree>
     <p:extLst>
       <p:ext uri="{BB962C8B-B14F-4D97-AF65-F5344CB8AC3E}">
-        <p14:creationId xmlns:p14="http://schemas.microsoft.com/office/powerpoint/2010/main" val="242548804"/>
+        <p14:creationId xmlns:p14="http://schemas.microsoft.com/office/powerpoint/2010/main" val="2271061398"/>
       </p:ext>
     </p:extLst>
   </p:cSld>
@@ -3835,42 +3794,73 @@
           <a:p>
             <a:r>
               <a:rPr lang="en-US" dirty="0" smtClean="0"/>
-              <a:t>Telson length comparison by MOATS</a:t>
+              <a:t>Basic stats</a:t>
             </a:r>
             <a:endParaRPr lang="en-US" dirty="0"/>
           </a:p>
         </p:txBody>
       </p:sp>
-      <p:pic>
-        <p:nvPicPr>
-          <p:cNvPr id="5" name="Content Placeholder 4"/>
-          <p:cNvPicPr>
-            <a:picLocks noGrp="1" noChangeAspect="1"/>
-          </p:cNvPicPr>
-          <p:nvPr>
-            <p:ph idx="1"/>
-          </p:nvPr>
-        </p:nvPicPr>
-        <p:blipFill>
-          <a:blip r:embed="rId2"/>
-          <a:stretch>
-            <a:fillRect/>
-          </a:stretch>
-        </p:blipFill>
-        <p:spPr>
-          <a:xfrm>
-            <a:off x="2273431" y="1690688"/>
-            <a:ext cx="7645138" cy="4718142"/>
-          </a:xfrm>
-          <a:prstGeom prst="rect">
-            <a:avLst/>
-          </a:prstGeom>
-        </p:spPr>
-      </p:pic>
+      <p:graphicFrame>
+        <p:nvGraphicFramePr>
+          <p:cNvPr id="6" name="Object 5"/>
+          <p:cNvGraphicFramePr>
+            <a:graphicFrameLocks noChangeAspect="1"/>
+          </p:cNvGraphicFramePr>
+          <p:nvPr>
+            <p:extLst>
+              <p:ext uri="{D42A27DB-BD31-4B8C-83A1-F6EECF244321}">
+                <p14:modId xmlns:p14="http://schemas.microsoft.com/office/powerpoint/2010/main" val="2648305536"/>
+              </p:ext>
+            </p:extLst>
+          </p:nvPr>
+        </p:nvGraphicFramePr>
+        <p:xfrm>
+          <a:off x="751703" y="2335427"/>
+          <a:ext cx="10884191" cy="2644347"/>
+        </p:xfrm>
+        <a:graphic>
+          <a:graphicData uri="http://schemas.openxmlformats.org/presentationml/2006/ole">
+            <mc:AlternateContent xmlns:mc="http://schemas.openxmlformats.org/markup-compatibility/2006">
+              <mc:Choice xmlns:v="urn:schemas-microsoft-com:vml" Requires="v">
+                <p:oleObj spid="_x0000_s2060" name="Worksheet" r:id="rId3" imgW="7096031" imgH="1723972" progId="Excel.Sheet.12">
+                  <p:embed/>
+                </p:oleObj>
+              </mc:Choice>
+              <mc:Fallback>
+                <p:oleObj name="Worksheet" r:id="rId3" imgW="7096031" imgH="1723972" progId="Excel.Sheet.12">
+                  <p:embed/>
+                  <p:pic>
+                    <p:nvPicPr>
+                      <p:cNvPr id="0" name=""/>
+                      <p:cNvPicPr/>
+                      <p:nvPr/>
+                    </p:nvPicPr>
+                    <p:blipFill>
+                      <a:blip r:embed="rId4"/>
+                      <a:stretch>
+                        <a:fillRect/>
+                      </a:stretch>
+                    </p:blipFill>
+                    <p:spPr>
+                      <a:xfrm>
+                        <a:off x="751703" y="2335427"/>
+                        <a:ext cx="10884191" cy="2644347"/>
+                      </a:xfrm>
+                      <a:prstGeom prst="rect">
+                        <a:avLst/>
+                      </a:prstGeom>
+                    </p:spPr>
+                  </p:pic>
+                </p:oleObj>
+              </mc:Fallback>
+            </mc:AlternateContent>
+          </a:graphicData>
+        </a:graphic>
+      </p:graphicFrame>
     </p:spTree>
     <p:extLst>
       <p:ext uri="{BB962C8B-B14F-4D97-AF65-F5344CB8AC3E}">
-        <p14:creationId xmlns:p14="http://schemas.microsoft.com/office/powerpoint/2010/main" val="1774631344"/>
+        <p14:creationId xmlns:p14="http://schemas.microsoft.com/office/powerpoint/2010/main" val="3803969312"/>
       </p:ext>
     </p:extLst>
   </p:cSld>
@@ -4001,7 +3991,7 @@
           <a:p>
             <a:r>
               <a:rPr lang="en-US" dirty="0" smtClean="0"/>
-              <a:t>Treatment comparison of weight</a:t>
+              <a:t>Correlation of telson length and wet weight</a:t>
             </a:r>
             <a:endParaRPr lang="en-US" dirty="0"/>
           </a:p>
@@ -4009,7 +3999,7 @@
       </p:sp>
       <p:pic>
         <p:nvPicPr>
-          <p:cNvPr id="5" name="Content Placeholder 4"/>
+          <p:cNvPr id="4" name="Content Placeholder 3"/>
           <p:cNvPicPr>
             <a:picLocks noGrp="1" noChangeAspect="1"/>
           </p:cNvPicPr>
@@ -4025,8 +4015,8 @@
         </p:blipFill>
         <p:spPr>
           <a:xfrm>
-            <a:off x="2178114" y="1520405"/>
-            <a:ext cx="7835771" cy="4835790"/>
+            <a:off x="2262280" y="1690688"/>
+            <a:ext cx="7667440" cy="4731906"/>
           </a:xfrm>
           <a:prstGeom prst="rect">
             <a:avLst/>
@@ -4036,7 +4026,7 @@
     </p:spTree>
     <p:extLst>
       <p:ext uri="{BB962C8B-B14F-4D97-AF65-F5344CB8AC3E}">
-        <p14:creationId xmlns:p14="http://schemas.microsoft.com/office/powerpoint/2010/main" val="1132337531"/>
+        <p14:creationId xmlns:p14="http://schemas.microsoft.com/office/powerpoint/2010/main" val="3053374340"/>
       </p:ext>
     </p:extLst>
   </p:cSld>
@@ -4080,7 +4070,7 @@
           <a:p>
             <a:r>
               <a:rPr lang="en-US" dirty="0" smtClean="0"/>
-              <a:t>Wet weight comparison by MOATS</a:t>
+              <a:t>LM of telson length fixed at treatment</a:t>
             </a:r>
             <a:endParaRPr lang="en-US" dirty="0"/>
           </a:p>
@@ -4088,7 +4078,7 @@
       </p:sp>
       <p:pic>
         <p:nvPicPr>
-          <p:cNvPr id="5" name="Content Placeholder 4"/>
+          <p:cNvPr id="4" name="Content Placeholder 3"/>
           <p:cNvPicPr>
             <a:picLocks noGrp="1" noChangeAspect="1"/>
           </p:cNvPicPr>
@@ -4104,8 +4094,8 @@
         </p:blipFill>
         <p:spPr>
           <a:xfrm>
-            <a:off x="2195372" y="1690688"/>
-            <a:ext cx="7801255" cy="4814489"/>
+            <a:off x="2620537" y="2129842"/>
+            <a:ext cx="6337958" cy="4414627"/>
           </a:xfrm>
           <a:prstGeom prst="rect">
             <a:avLst/>
@@ -4115,7 +4105,7 @@
     </p:spTree>
     <p:extLst>
       <p:ext uri="{BB962C8B-B14F-4D97-AF65-F5344CB8AC3E}">
-        <p14:creationId xmlns:p14="http://schemas.microsoft.com/office/powerpoint/2010/main" val="3630319748"/>
+        <p14:creationId xmlns:p14="http://schemas.microsoft.com/office/powerpoint/2010/main" val="1661914331"/>
       </p:ext>
     </p:extLst>
   </p:cSld>
@@ -4159,13 +4149,20 @@
           <a:p>
             <a:r>
               <a:rPr lang="en-US" dirty="0"/>
-              <a:t>Treatment comparison of </a:t>
+              <a:t>LM of </a:t>
             </a:r>
             <a:r>
               <a:rPr lang="en-US" dirty="0" smtClean="0"/>
-              <a:t>body condition</a:t>
-            </a:r>
-            <a:endParaRPr lang="en-US" dirty="0"/>
+              <a:t>wet </a:t>
+            </a:r>
+            <a:r>
+              <a:rPr lang="en-US" dirty="0" smtClean="0"/>
+              <a:t>weight </a:t>
+            </a:r>
+            <a:r>
+              <a:rPr lang="en-US" dirty="0"/>
+              <a:t>fixed at treatment</a:t>
+            </a:r>
           </a:p>
         </p:txBody>
       </p:sp>
@@ -4187,8 +4184,8 @@
         </p:blipFill>
         <p:spPr>
           <a:xfrm>
-            <a:off x="2173070" y="1690688"/>
-            <a:ext cx="7845860" cy="4842017"/>
+            <a:off x="3166307" y="1916713"/>
+            <a:ext cx="5859385" cy="4700750"/>
           </a:xfrm>
           <a:prstGeom prst="rect">
             <a:avLst/>
@@ -4198,7 +4195,7 @@
     </p:spTree>
     <p:extLst>
       <p:ext uri="{BB962C8B-B14F-4D97-AF65-F5344CB8AC3E}">
-        <p14:creationId xmlns:p14="http://schemas.microsoft.com/office/powerpoint/2010/main" val="2883542531"/>
+        <p14:creationId xmlns:p14="http://schemas.microsoft.com/office/powerpoint/2010/main" val="1864186638"/>
       </p:ext>
     </p:extLst>
   </p:cSld>
@@ -4241,22 +4238,27 @@
           <a:lstStyle/>
           <a:p>
             <a:r>
+              <a:rPr lang="en-US" dirty="0"/>
+              <a:t>LM of </a:t>
+            </a:r>
+            <a:r>
               <a:rPr lang="en-US" dirty="0" smtClean="0"/>
-              <a:t>Body condition comparison by MOATS</a:t>
-            </a:r>
-            <a:endParaRPr lang="en-US" dirty="0"/>
+              <a:t>body condition fixed </a:t>
+            </a:r>
+            <a:r>
+              <a:rPr lang="en-US" dirty="0"/>
+              <a:t>at treatment</a:t>
+            </a:r>
           </a:p>
         </p:txBody>
       </p:sp>
       <p:pic>
         <p:nvPicPr>
-          <p:cNvPr id="4" name="Content Placeholder 3"/>
+          <p:cNvPr id="3" name="Picture 2"/>
           <p:cNvPicPr>
-            <a:picLocks noGrp="1" noChangeAspect="1"/>
+            <a:picLocks noChangeAspect="1"/>
           </p:cNvPicPr>
-          <p:nvPr>
-            <p:ph idx="1"/>
-          </p:nvPr>
+          <p:nvPr/>
         </p:nvPicPr>
         <p:blipFill>
           <a:blip r:embed="rId2"/>
@@ -4266,8 +4268,8 @@
         </p:blipFill>
         <p:spPr>
           <a:xfrm>
-            <a:off x="2241356" y="1854942"/>
-            <a:ext cx="7709288" cy="4757732"/>
+            <a:off x="3271450" y="1933703"/>
+            <a:ext cx="6248025" cy="4627735"/>
           </a:xfrm>
           <a:prstGeom prst="rect">
             <a:avLst/>
@@ -4277,7 +4279,7 @@
     </p:spTree>
     <p:extLst>
       <p:ext uri="{BB962C8B-B14F-4D97-AF65-F5344CB8AC3E}">
-        <p14:creationId xmlns:p14="http://schemas.microsoft.com/office/powerpoint/2010/main" val="1573771286"/>
+        <p14:creationId xmlns:p14="http://schemas.microsoft.com/office/powerpoint/2010/main" val="4275333337"/>
       </p:ext>
     </p:extLst>
   </p:cSld>
@@ -4320,22 +4322,27 @@
           <a:lstStyle/>
           <a:p>
             <a:r>
+              <a:rPr lang="en-US" dirty="0"/>
+              <a:t>LM of </a:t>
+            </a:r>
+            <a:r>
               <a:rPr lang="en-US" dirty="0" smtClean="0"/>
-              <a:t>Linear mixed model for telson length</a:t>
-            </a:r>
-            <a:endParaRPr lang="en-US" dirty="0"/>
+              <a:t>Fulton’s K fixed </a:t>
+            </a:r>
+            <a:r>
+              <a:rPr lang="en-US" dirty="0"/>
+              <a:t>at treatment</a:t>
+            </a:r>
           </a:p>
         </p:txBody>
       </p:sp>
       <p:pic>
         <p:nvPicPr>
-          <p:cNvPr id="5" name="Content Placeholder 4"/>
+          <p:cNvPr id="3" name="Picture 2"/>
           <p:cNvPicPr>
-            <a:picLocks noGrp="1" noChangeAspect="1"/>
+            <a:picLocks noChangeAspect="1"/>
           </p:cNvPicPr>
-          <p:nvPr>
-            <p:ph idx="1"/>
-          </p:nvPr>
+          <p:nvPr/>
         </p:nvPicPr>
         <p:blipFill>
           <a:blip r:embed="rId2"/>
@@ -4345,8 +4352,8 @@
         </p:blipFill>
         <p:spPr>
           <a:xfrm>
-            <a:off x="2162001" y="1493003"/>
-            <a:ext cx="7867998" cy="4699389"/>
+            <a:off x="2890064" y="1448701"/>
+            <a:ext cx="6696148" cy="5043074"/>
           </a:xfrm>
           <a:prstGeom prst="rect">
             <a:avLst/>
@@ -4356,7 +4363,7 @@
     </p:spTree>
     <p:extLst>
       <p:ext uri="{BB962C8B-B14F-4D97-AF65-F5344CB8AC3E}">
-        <p14:creationId xmlns:p14="http://schemas.microsoft.com/office/powerpoint/2010/main" val="2794635674"/>
+        <p14:creationId xmlns:p14="http://schemas.microsoft.com/office/powerpoint/2010/main" val="916371209"/>
       </p:ext>
     </p:extLst>
   </p:cSld>
@@ -4393,14 +4400,19 @@
             <p:ph type="title"/>
           </p:nvPr>
         </p:nvSpPr>
-        <p:spPr/>
+        <p:spPr>
+          <a:xfrm>
+            <a:off x="838200" y="365126"/>
+            <a:ext cx="10123449" cy="883812"/>
+          </a:xfrm>
+        </p:spPr>
         <p:txBody>
           <a:bodyPr/>
           <a:lstStyle/>
           <a:p>
             <a:r>
               <a:rPr lang="en-US" dirty="0" smtClean="0"/>
-              <a:t>Linear mixed model for wet weight</a:t>
+              <a:t>Treatment comparison of TL</a:t>
             </a:r>
             <a:endParaRPr lang="en-US" dirty="0"/>
           </a:p>
@@ -4424,8 +4436,8 @@
         </p:blipFill>
         <p:spPr>
           <a:xfrm>
-            <a:off x="1935027" y="1571199"/>
-            <a:ext cx="8321946" cy="4887313"/>
+            <a:off x="2077355" y="1542707"/>
+            <a:ext cx="7645138" cy="4718142"/>
           </a:xfrm>
           <a:prstGeom prst="rect">
             <a:avLst/>
@@ -4435,7 +4447,7 @@
     </p:spTree>
     <p:extLst>
       <p:ext uri="{BB962C8B-B14F-4D97-AF65-F5344CB8AC3E}">
-        <p14:creationId xmlns:p14="http://schemas.microsoft.com/office/powerpoint/2010/main" val="451297770"/>
+        <p14:creationId xmlns:p14="http://schemas.microsoft.com/office/powerpoint/2010/main" val="242548804"/>
       </p:ext>
     </p:extLst>
   </p:cSld>
@@ -4478,12 +4490,8 @@
           <a:lstStyle/>
           <a:p>
             <a:r>
-              <a:rPr lang="en-US" dirty="0"/>
-              <a:t>Linear mixed model for </a:t>
-            </a:r>
-            <a:r>
               <a:rPr lang="en-US" dirty="0" smtClean="0"/>
-              <a:t>body condition</a:t>
+              <a:t>Telson length comparison by MOATS</a:t>
             </a:r>
             <a:endParaRPr lang="en-US" dirty="0"/>
           </a:p>
@@ -4491,7 +4499,7 @@
       </p:sp>
       <p:pic>
         <p:nvPicPr>
-          <p:cNvPr id="4" name="Content Placeholder 3"/>
+          <p:cNvPr id="5" name="Content Placeholder 4"/>
           <p:cNvPicPr>
             <a:picLocks noGrp="1" noChangeAspect="1"/>
           </p:cNvPicPr>
@@ -4507,8 +4515,8 @@
         </p:blipFill>
         <p:spPr>
           <a:xfrm>
-            <a:off x="1969010" y="1550020"/>
-            <a:ext cx="8253980" cy="4575814"/>
+            <a:off x="2273431" y="1690688"/>
+            <a:ext cx="7645138" cy="4718142"/>
           </a:xfrm>
           <a:prstGeom prst="rect">
             <a:avLst/>
@@ -4518,7 +4526,248 @@
     </p:spTree>
     <p:extLst>
       <p:ext uri="{BB962C8B-B14F-4D97-AF65-F5344CB8AC3E}">
-        <p14:creationId xmlns:p14="http://schemas.microsoft.com/office/powerpoint/2010/main" val="3723987516"/>
+        <p14:creationId xmlns:p14="http://schemas.microsoft.com/office/powerpoint/2010/main" val="1774631344"/>
+      </p:ext>
+    </p:extLst>
+  </p:cSld>
+  <p:clrMapOvr>
+    <a:masterClrMapping/>
+  </p:clrMapOvr>
+</p:sld>
+</file>
+
+<file path=ppt/slides/slide27.xml><?xml version="1.0" encoding="utf-8"?>
+<p:sld xmlns:a="http://schemas.openxmlformats.org/drawingml/2006/main" xmlns:r="http://schemas.openxmlformats.org/officeDocument/2006/relationships" xmlns:p="http://schemas.openxmlformats.org/presentationml/2006/main">
+  <p:cSld>
+    <p:spTree>
+      <p:nvGrpSpPr>
+        <p:cNvPr id="1" name=""/>
+        <p:cNvGrpSpPr/>
+        <p:nvPr/>
+      </p:nvGrpSpPr>
+      <p:grpSpPr>
+        <a:xfrm>
+          <a:off x="0" y="0"/>
+          <a:ext cx="0" cy="0"/>
+          <a:chOff x="0" y="0"/>
+          <a:chExt cx="0" cy="0"/>
+        </a:xfrm>
+      </p:grpSpPr>
+      <p:sp>
+        <p:nvSpPr>
+          <p:cNvPr id="2" name="Title 1"/>
+          <p:cNvSpPr>
+            <a:spLocks noGrp="1"/>
+          </p:cNvSpPr>
+          <p:nvPr>
+            <p:ph type="title"/>
+          </p:nvPr>
+        </p:nvSpPr>
+        <p:spPr/>
+        <p:txBody>
+          <a:bodyPr/>
+          <a:lstStyle/>
+          <a:p>
+            <a:r>
+              <a:rPr lang="en-US" dirty="0" smtClean="0"/>
+              <a:t>Treatment comparison of weight</a:t>
+            </a:r>
+            <a:endParaRPr lang="en-US" dirty="0"/>
+          </a:p>
+        </p:txBody>
+      </p:sp>
+      <p:pic>
+        <p:nvPicPr>
+          <p:cNvPr id="5" name="Content Placeholder 4"/>
+          <p:cNvPicPr>
+            <a:picLocks noGrp="1" noChangeAspect="1"/>
+          </p:cNvPicPr>
+          <p:nvPr>
+            <p:ph idx="1"/>
+          </p:nvPr>
+        </p:nvPicPr>
+        <p:blipFill>
+          <a:blip r:embed="rId2"/>
+          <a:stretch>
+            <a:fillRect/>
+          </a:stretch>
+        </p:blipFill>
+        <p:spPr>
+          <a:xfrm>
+            <a:off x="2178114" y="1520405"/>
+            <a:ext cx="7835771" cy="4835790"/>
+          </a:xfrm>
+          <a:prstGeom prst="rect">
+            <a:avLst/>
+          </a:prstGeom>
+        </p:spPr>
+      </p:pic>
+    </p:spTree>
+    <p:extLst>
+      <p:ext uri="{BB962C8B-B14F-4D97-AF65-F5344CB8AC3E}">
+        <p14:creationId xmlns:p14="http://schemas.microsoft.com/office/powerpoint/2010/main" val="1132337531"/>
+      </p:ext>
+    </p:extLst>
+  </p:cSld>
+  <p:clrMapOvr>
+    <a:masterClrMapping/>
+  </p:clrMapOvr>
+</p:sld>
+</file>
+
+<file path=ppt/slides/slide28.xml><?xml version="1.0" encoding="utf-8"?>
+<p:sld xmlns:a="http://schemas.openxmlformats.org/drawingml/2006/main" xmlns:r="http://schemas.openxmlformats.org/officeDocument/2006/relationships" xmlns:p="http://schemas.openxmlformats.org/presentationml/2006/main">
+  <p:cSld>
+    <p:spTree>
+      <p:nvGrpSpPr>
+        <p:cNvPr id="1" name=""/>
+        <p:cNvGrpSpPr/>
+        <p:nvPr/>
+      </p:nvGrpSpPr>
+      <p:grpSpPr>
+        <a:xfrm>
+          <a:off x="0" y="0"/>
+          <a:ext cx="0" cy="0"/>
+          <a:chOff x="0" y="0"/>
+          <a:chExt cx="0" cy="0"/>
+        </a:xfrm>
+      </p:grpSpPr>
+      <p:sp>
+        <p:nvSpPr>
+          <p:cNvPr id="2" name="Title 1"/>
+          <p:cNvSpPr>
+            <a:spLocks noGrp="1"/>
+          </p:cNvSpPr>
+          <p:nvPr>
+            <p:ph type="title"/>
+          </p:nvPr>
+        </p:nvSpPr>
+        <p:spPr/>
+        <p:txBody>
+          <a:bodyPr/>
+          <a:lstStyle/>
+          <a:p>
+            <a:r>
+              <a:rPr lang="en-US" dirty="0" smtClean="0"/>
+              <a:t>Wet weight comparison by MOATS</a:t>
+            </a:r>
+            <a:endParaRPr lang="en-US" dirty="0"/>
+          </a:p>
+        </p:txBody>
+      </p:sp>
+      <p:pic>
+        <p:nvPicPr>
+          <p:cNvPr id="5" name="Content Placeholder 4"/>
+          <p:cNvPicPr>
+            <a:picLocks noGrp="1" noChangeAspect="1"/>
+          </p:cNvPicPr>
+          <p:nvPr>
+            <p:ph idx="1"/>
+          </p:nvPr>
+        </p:nvPicPr>
+        <p:blipFill>
+          <a:blip r:embed="rId2"/>
+          <a:stretch>
+            <a:fillRect/>
+          </a:stretch>
+        </p:blipFill>
+        <p:spPr>
+          <a:xfrm>
+            <a:off x="2195372" y="1690688"/>
+            <a:ext cx="7801255" cy="4814489"/>
+          </a:xfrm>
+          <a:prstGeom prst="rect">
+            <a:avLst/>
+          </a:prstGeom>
+        </p:spPr>
+      </p:pic>
+    </p:spTree>
+    <p:extLst>
+      <p:ext uri="{BB962C8B-B14F-4D97-AF65-F5344CB8AC3E}">
+        <p14:creationId xmlns:p14="http://schemas.microsoft.com/office/powerpoint/2010/main" val="3630319748"/>
+      </p:ext>
+    </p:extLst>
+  </p:cSld>
+  <p:clrMapOvr>
+    <a:masterClrMapping/>
+  </p:clrMapOvr>
+</p:sld>
+</file>
+
+<file path=ppt/slides/slide29.xml><?xml version="1.0" encoding="utf-8"?>
+<p:sld xmlns:a="http://schemas.openxmlformats.org/drawingml/2006/main" xmlns:r="http://schemas.openxmlformats.org/officeDocument/2006/relationships" xmlns:p="http://schemas.openxmlformats.org/presentationml/2006/main">
+  <p:cSld>
+    <p:spTree>
+      <p:nvGrpSpPr>
+        <p:cNvPr id="1" name=""/>
+        <p:cNvGrpSpPr/>
+        <p:nvPr/>
+      </p:nvGrpSpPr>
+      <p:grpSpPr>
+        <a:xfrm>
+          <a:off x="0" y="0"/>
+          <a:ext cx="0" cy="0"/>
+          <a:chOff x="0" y="0"/>
+          <a:chExt cx="0" cy="0"/>
+        </a:xfrm>
+      </p:grpSpPr>
+      <p:sp>
+        <p:nvSpPr>
+          <p:cNvPr id="2" name="Title 1"/>
+          <p:cNvSpPr>
+            <a:spLocks noGrp="1"/>
+          </p:cNvSpPr>
+          <p:nvPr>
+            <p:ph type="title"/>
+          </p:nvPr>
+        </p:nvSpPr>
+        <p:spPr/>
+        <p:txBody>
+          <a:bodyPr/>
+          <a:lstStyle/>
+          <a:p>
+            <a:r>
+              <a:rPr lang="en-US" dirty="0"/>
+              <a:t>Treatment comparison of </a:t>
+            </a:r>
+            <a:r>
+              <a:rPr lang="en-US" dirty="0" smtClean="0"/>
+              <a:t>body condition</a:t>
+            </a:r>
+            <a:endParaRPr lang="en-US" dirty="0"/>
+          </a:p>
+        </p:txBody>
+      </p:sp>
+      <p:pic>
+        <p:nvPicPr>
+          <p:cNvPr id="4" name="Content Placeholder 3"/>
+          <p:cNvPicPr>
+            <a:picLocks noGrp="1" noChangeAspect="1"/>
+          </p:cNvPicPr>
+          <p:nvPr>
+            <p:ph idx="1"/>
+          </p:nvPr>
+        </p:nvPicPr>
+        <p:blipFill>
+          <a:blip r:embed="rId2"/>
+          <a:stretch>
+            <a:fillRect/>
+          </a:stretch>
+        </p:blipFill>
+        <p:spPr>
+          <a:xfrm>
+            <a:off x="2173070" y="1690688"/>
+            <a:ext cx="7845860" cy="4842017"/>
+          </a:xfrm>
+          <a:prstGeom prst="rect">
+            <a:avLst/>
+          </a:prstGeom>
+        </p:spPr>
+      </p:pic>
+    </p:spTree>
+    <p:extLst>
+      <p:ext uri="{BB962C8B-B14F-4D97-AF65-F5344CB8AC3E}">
+        <p14:creationId xmlns:p14="http://schemas.microsoft.com/office/powerpoint/2010/main" val="2883542531"/>
       </p:ext>
     </p:extLst>
   </p:cSld>
@@ -4612,6 +4861,568 @@
 </p:sld>
 </file>
 
+<file path=ppt/slides/slide30.xml><?xml version="1.0" encoding="utf-8"?>
+<p:sld xmlns:a="http://schemas.openxmlformats.org/drawingml/2006/main" xmlns:r="http://schemas.openxmlformats.org/officeDocument/2006/relationships" xmlns:p="http://schemas.openxmlformats.org/presentationml/2006/main">
+  <p:cSld>
+    <p:spTree>
+      <p:nvGrpSpPr>
+        <p:cNvPr id="1" name=""/>
+        <p:cNvGrpSpPr/>
+        <p:nvPr/>
+      </p:nvGrpSpPr>
+      <p:grpSpPr>
+        <a:xfrm>
+          <a:off x="0" y="0"/>
+          <a:ext cx="0" cy="0"/>
+          <a:chOff x="0" y="0"/>
+          <a:chExt cx="0" cy="0"/>
+        </a:xfrm>
+      </p:grpSpPr>
+      <p:sp>
+        <p:nvSpPr>
+          <p:cNvPr id="2" name="Title 1"/>
+          <p:cNvSpPr>
+            <a:spLocks noGrp="1"/>
+          </p:cNvSpPr>
+          <p:nvPr>
+            <p:ph type="title"/>
+          </p:nvPr>
+        </p:nvSpPr>
+        <p:spPr/>
+        <p:txBody>
+          <a:bodyPr/>
+          <a:lstStyle/>
+          <a:p>
+            <a:r>
+              <a:rPr lang="en-US" dirty="0" smtClean="0"/>
+              <a:t>Body condition comparison by MOATS</a:t>
+            </a:r>
+            <a:endParaRPr lang="en-US" dirty="0"/>
+          </a:p>
+        </p:txBody>
+      </p:sp>
+      <p:pic>
+        <p:nvPicPr>
+          <p:cNvPr id="4" name="Content Placeholder 3"/>
+          <p:cNvPicPr>
+            <a:picLocks noGrp="1" noChangeAspect="1"/>
+          </p:cNvPicPr>
+          <p:nvPr>
+            <p:ph idx="1"/>
+          </p:nvPr>
+        </p:nvPicPr>
+        <p:blipFill>
+          <a:blip r:embed="rId2"/>
+          <a:stretch>
+            <a:fillRect/>
+          </a:stretch>
+        </p:blipFill>
+        <p:spPr>
+          <a:xfrm>
+            <a:off x="2241356" y="1854942"/>
+            <a:ext cx="7709288" cy="4757732"/>
+          </a:xfrm>
+          <a:prstGeom prst="rect">
+            <a:avLst/>
+          </a:prstGeom>
+        </p:spPr>
+      </p:pic>
+    </p:spTree>
+    <p:extLst>
+      <p:ext uri="{BB962C8B-B14F-4D97-AF65-F5344CB8AC3E}">
+        <p14:creationId xmlns:p14="http://schemas.microsoft.com/office/powerpoint/2010/main" val="1573771286"/>
+      </p:ext>
+    </p:extLst>
+  </p:cSld>
+  <p:clrMapOvr>
+    <a:masterClrMapping/>
+  </p:clrMapOvr>
+</p:sld>
+</file>
+
+<file path=ppt/slides/slide31.xml><?xml version="1.0" encoding="utf-8"?>
+<p:sld xmlns:a="http://schemas.openxmlformats.org/drawingml/2006/main" xmlns:r="http://schemas.openxmlformats.org/officeDocument/2006/relationships" xmlns:p="http://schemas.openxmlformats.org/presentationml/2006/main">
+  <p:cSld>
+    <p:spTree>
+      <p:nvGrpSpPr>
+        <p:cNvPr id="1" name=""/>
+        <p:cNvGrpSpPr/>
+        <p:nvPr/>
+      </p:nvGrpSpPr>
+      <p:grpSpPr>
+        <a:xfrm>
+          <a:off x="0" y="0"/>
+          <a:ext cx="0" cy="0"/>
+          <a:chOff x="0" y="0"/>
+          <a:chExt cx="0" cy="0"/>
+        </a:xfrm>
+      </p:grpSpPr>
+      <p:sp>
+        <p:nvSpPr>
+          <p:cNvPr id="2" name="Title 1"/>
+          <p:cNvSpPr>
+            <a:spLocks noGrp="1"/>
+          </p:cNvSpPr>
+          <p:nvPr>
+            <p:ph type="title"/>
+          </p:nvPr>
+        </p:nvSpPr>
+        <p:spPr/>
+        <p:txBody>
+          <a:bodyPr/>
+          <a:lstStyle/>
+          <a:p>
+            <a:r>
+              <a:rPr lang="en-US" dirty="0"/>
+              <a:t>Treatment comparison of </a:t>
+            </a:r>
+            <a:r>
+              <a:rPr lang="en-US" dirty="0" smtClean="0"/>
+              <a:t>Fulton’s K</a:t>
+            </a:r>
+            <a:endParaRPr lang="en-US" dirty="0"/>
+          </a:p>
+        </p:txBody>
+      </p:sp>
+      <p:pic>
+        <p:nvPicPr>
+          <p:cNvPr id="3" name="Picture 2"/>
+          <p:cNvPicPr>
+            <a:picLocks noChangeAspect="1"/>
+          </p:cNvPicPr>
+          <p:nvPr/>
+        </p:nvPicPr>
+        <p:blipFill>
+          <a:blip r:embed="rId2"/>
+          <a:stretch>
+            <a:fillRect/>
+          </a:stretch>
+        </p:blipFill>
+        <p:spPr>
+          <a:xfrm>
+            <a:off x="2121738" y="1445997"/>
+            <a:ext cx="7948524" cy="4905375"/>
+          </a:xfrm>
+          <a:prstGeom prst="rect">
+            <a:avLst/>
+          </a:prstGeom>
+        </p:spPr>
+      </p:pic>
+    </p:spTree>
+    <p:extLst>
+      <p:ext uri="{BB962C8B-B14F-4D97-AF65-F5344CB8AC3E}">
+        <p14:creationId xmlns:p14="http://schemas.microsoft.com/office/powerpoint/2010/main" val="2956146597"/>
+      </p:ext>
+    </p:extLst>
+  </p:cSld>
+  <p:clrMapOvr>
+    <a:masterClrMapping/>
+  </p:clrMapOvr>
+</p:sld>
+</file>
+
+<file path=ppt/slides/slide32.xml><?xml version="1.0" encoding="utf-8"?>
+<p:sld xmlns:a="http://schemas.openxmlformats.org/drawingml/2006/main" xmlns:r="http://schemas.openxmlformats.org/officeDocument/2006/relationships" xmlns:p="http://schemas.openxmlformats.org/presentationml/2006/main">
+  <p:cSld>
+    <p:spTree>
+      <p:nvGrpSpPr>
+        <p:cNvPr id="1" name=""/>
+        <p:cNvGrpSpPr/>
+        <p:nvPr/>
+      </p:nvGrpSpPr>
+      <p:grpSpPr>
+        <a:xfrm>
+          <a:off x="0" y="0"/>
+          <a:ext cx="0" cy="0"/>
+          <a:chOff x="0" y="0"/>
+          <a:chExt cx="0" cy="0"/>
+        </a:xfrm>
+      </p:grpSpPr>
+      <p:sp>
+        <p:nvSpPr>
+          <p:cNvPr id="2" name="Title 1"/>
+          <p:cNvSpPr>
+            <a:spLocks noGrp="1"/>
+          </p:cNvSpPr>
+          <p:nvPr>
+            <p:ph type="title"/>
+          </p:nvPr>
+        </p:nvSpPr>
+        <p:spPr/>
+        <p:txBody>
+          <a:bodyPr/>
+          <a:lstStyle/>
+          <a:p>
+            <a:r>
+              <a:rPr lang="en-US" dirty="0" smtClean="0"/>
+              <a:t>Fulton’s K comparison </a:t>
+            </a:r>
+            <a:r>
+              <a:rPr lang="en-US" dirty="0"/>
+              <a:t>by MOATS</a:t>
+            </a:r>
+          </a:p>
+        </p:txBody>
+      </p:sp>
+      <p:pic>
+        <p:nvPicPr>
+          <p:cNvPr id="4" name="Picture 3"/>
+          <p:cNvPicPr>
+            <a:picLocks noChangeAspect="1"/>
+          </p:cNvPicPr>
+          <p:nvPr/>
+        </p:nvPicPr>
+        <p:blipFill>
+          <a:blip r:embed="rId2"/>
+          <a:stretch>
+            <a:fillRect/>
+          </a:stretch>
+        </p:blipFill>
+        <p:spPr>
+          <a:xfrm>
+            <a:off x="2001602" y="1433639"/>
+            <a:ext cx="8188796" cy="5053657"/>
+          </a:xfrm>
+          <a:prstGeom prst="rect">
+            <a:avLst/>
+          </a:prstGeom>
+        </p:spPr>
+      </p:pic>
+    </p:spTree>
+    <p:extLst>
+      <p:ext uri="{BB962C8B-B14F-4D97-AF65-F5344CB8AC3E}">
+        <p14:creationId xmlns:p14="http://schemas.microsoft.com/office/powerpoint/2010/main" val="3960566463"/>
+      </p:ext>
+    </p:extLst>
+  </p:cSld>
+  <p:clrMapOvr>
+    <a:masterClrMapping/>
+  </p:clrMapOvr>
+</p:sld>
+</file>
+
+<file path=ppt/slides/slide33.xml><?xml version="1.0" encoding="utf-8"?>
+<p:sld xmlns:a="http://schemas.openxmlformats.org/drawingml/2006/main" xmlns:r="http://schemas.openxmlformats.org/officeDocument/2006/relationships" xmlns:p="http://schemas.openxmlformats.org/presentationml/2006/main">
+  <p:cSld>
+    <p:spTree>
+      <p:nvGrpSpPr>
+        <p:cNvPr id="1" name=""/>
+        <p:cNvGrpSpPr/>
+        <p:nvPr/>
+      </p:nvGrpSpPr>
+      <p:grpSpPr>
+        <a:xfrm>
+          <a:off x="0" y="0"/>
+          <a:ext cx="0" cy="0"/>
+          <a:chOff x="0" y="0"/>
+          <a:chExt cx="0" cy="0"/>
+        </a:xfrm>
+      </p:grpSpPr>
+      <p:sp>
+        <p:nvSpPr>
+          <p:cNvPr id="2" name="Title 1"/>
+          <p:cNvSpPr>
+            <a:spLocks noGrp="1"/>
+          </p:cNvSpPr>
+          <p:nvPr>
+            <p:ph type="title"/>
+          </p:nvPr>
+        </p:nvSpPr>
+        <p:spPr/>
+        <p:txBody>
+          <a:bodyPr/>
+          <a:lstStyle/>
+          <a:p>
+            <a:r>
+              <a:rPr lang="en-US" dirty="0" smtClean="0"/>
+              <a:t>Linear mixed model for telson length</a:t>
+            </a:r>
+            <a:endParaRPr lang="en-US" dirty="0"/>
+          </a:p>
+        </p:txBody>
+      </p:sp>
+      <p:pic>
+        <p:nvPicPr>
+          <p:cNvPr id="5" name="Content Placeholder 4"/>
+          <p:cNvPicPr>
+            <a:picLocks noGrp="1" noChangeAspect="1"/>
+          </p:cNvPicPr>
+          <p:nvPr>
+            <p:ph idx="1"/>
+          </p:nvPr>
+        </p:nvPicPr>
+        <p:blipFill>
+          <a:blip r:embed="rId2"/>
+          <a:stretch>
+            <a:fillRect/>
+          </a:stretch>
+        </p:blipFill>
+        <p:spPr>
+          <a:xfrm>
+            <a:off x="2162001" y="1493003"/>
+            <a:ext cx="7867998" cy="4699389"/>
+          </a:xfrm>
+          <a:prstGeom prst="rect">
+            <a:avLst/>
+          </a:prstGeom>
+        </p:spPr>
+      </p:pic>
+    </p:spTree>
+    <p:extLst>
+      <p:ext uri="{BB962C8B-B14F-4D97-AF65-F5344CB8AC3E}">
+        <p14:creationId xmlns:p14="http://schemas.microsoft.com/office/powerpoint/2010/main" val="2794635674"/>
+      </p:ext>
+    </p:extLst>
+  </p:cSld>
+  <p:clrMapOvr>
+    <a:masterClrMapping/>
+  </p:clrMapOvr>
+</p:sld>
+</file>
+
+<file path=ppt/slides/slide34.xml><?xml version="1.0" encoding="utf-8"?>
+<p:sld xmlns:a="http://schemas.openxmlformats.org/drawingml/2006/main" xmlns:r="http://schemas.openxmlformats.org/officeDocument/2006/relationships" xmlns:p="http://schemas.openxmlformats.org/presentationml/2006/main">
+  <p:cSld>
+    <p:spTree>
+      <p:nvGrpSpPr>
+        <p:cNvPr id="1" name=""/>
+        <p:cNvGrpSpPr/>
+        <p:nvPr/>
+      </p:nvGrpSpPr>
+      <p:grpSpPr>
+        <a:xfrm>
+          <a:off x="0" y="0"/>
+          <a:ext cx="0" cy="0"/>
+          <a:chOff x="0" y="0"/>
+          <a:chExt cx="0" cy="0"/>
+        </a:xfrm>
+      </p:grpSpPr>
+      <p:sp>
+        <p:nvSpPr>
+          <p:cNvPr id="2" name="Title 1"/>
+          <p:cNvSpPr>
+            <a:spLocks noGrp="1"/>
+          </p:cNvSpPr>
+          <p:nvPr>
+            <p:ph type="title"/>
+          </p:nvPr>
+        </p:nvSpPr>
+        <p:spPr/>
+        <p:txBody>
+          <a:bodyPr/>
+          <a:lstStyle/>
+          <a:p>
+            <a:r>
+              <a:rPr lang="en-US" dirty="0" smtClean="0"/>
+              <a:t>Linear mixed model for wet weight</a:t>
+            </a:r>
+            <a:endParaRPr lang="en-US" dirty="0"/>
+          </a:p>
+        </p:txBody>
+      </p:sp>
+      <p:pic>
+        <p:nvPicPr>
+          <p:cNvPr id="5" name="Content Placeholder 4"/>
+          <p:cNvPicPr>
+            <a:picLocks noGrp="1" noChangeAspect="1"/>
+          </p:cNvPicPr>
+          <p:nvPr>
+            <p:ph idx="1"/>
+          </p:nvPr>
+        </p:nvPicPr>
+        <p:blipFill>
+          <a:blip r:embed="rId2"/>
+          <a:stretch>
+            <a:fillRect/>
+          </a:stretch>
+        </p:blipFill>
+        <p:spPr>
+          <a:xfrm>
+            <a:off x="1935027" y="1571199"/>
+            <a:ext cx="8321946" cy="4887313"/>
+          </a:xfrm>
+          <a:prstGeom prst="rect">
+            <a:avLst/>
+          </a:prstGeom>
+        </p:spPr>
+      </p:pic>
+    </p:spTree>
+    <p:extLst>
+      <p:ext uri="{BB962C8B-B14F-4D97-AF65-F5344CB8AC3E}">
+        <p14:creationId xmlns:p14="http://schemas.microsoft.com/office/powerpoint/2010/main" val="451297770"/>
+      </p:ext>
+    </p:extLst>
+  </p:cSld>
+  <p:clrMapOvr>
+    <a:masterClrMapping/>
+  </p:clrMapOvr>
+</p:sld>
+</file>
+
+<file path=ppt/slides/slide35.xml><?xml version="1.0" encoding="utf-8"?>
+<p:sld xmlns:a="http://schemas.openxmlformats.org/drawingml/2006/main" xmlns:r="http://schemas.openxmlformats.org/officeDocument/2006/relationships" xmlns:p="http://schemas.openxmlformats.org/presentationml/2006/main">
+  <p:cSld>
+    <p:spTree>
+      <p:nvGrpSpPr>
+        <p:cNvPr id="1" name=""/>
+        <p:cNvGrpSpPr/>
+        <p:nvPr/>
+      </p:nvGrpSpPr>
+      <p:grpSpPr>
+        <a:xfrm>
+          <a:off x="0" y="0"/>
+          <a:ext cx="0" cy="0"/>
+          <a:chOff x="0" y="0"/>
+          <a:chExt cx="0" cy="0"/>
+        </a:xfrm>
+      </p:grpSpPr>
+      <p:sp>
+        <p:nvSpPr>
+          <p:cNvPr id="2" name="Title 1"/>
+          <p:cNvSpPr>
+            <a:spLocks noGrp="1"/>
+          </p:cNvSpPr>
+          <p:nvPr>
+            <p:ph type="title"/>
+          </p:nvPr>
+        </p:nvSpPr>
+        <p:spPr/>
+        <p:txBody>
+          <a:bodyPr/>
+          <a:lstStyle/>
+          <a:p>
+            <a:r>
+              <a:rPr lang="en-US" dirty="0"/>
+              <a:t>Linear mixed model for </a:t>
+            </a:r>
+            <a:r>
+              <a:rPr lang="en-US" dirty="0" smtClean="0"/>
+              <a:t>body condition</a:t>
+            </a:r>
+            <a:endParaRPr lang="en-US" dirty="0"/>
+          </a:p>
+        </p:txBody>
+      </p:sp>
+      <p:pic>
+        <p:nvPicPr>
+          <p:cNvPr id="4" name="Content Placeholder 3"/>
+          <p:cNvPicPr>
+            <a:picLocks noGrp="1" noChangeAspect="1"/>
+          </p:cNvPicPr>
+          <p:nvPr>
+            <p:ph idx="1"/>
+          </p:nvPr>
+        </p:nvPicPr>
+        <p:blipFill>
+          <a:blip r:embed="rId2"/>
+          <a:stretch>
+            <a:fillRect/>
+          </a:stretch>
+        </p:blipFill>
+        <p:spPr>
+          <a:xfrm>
+            <a:off x="1969010" y="1550020"/>
+            <a:ext cx="8253980" cy="4575814"/>
+          </a:xfrm>
+          <a:prstGeom prst="rect">
+            <a:avLst/>
+          </a:prstGeom>
+        </p:spPr>
+      </p:pic>
+    </p:spTree>
+    <p:extLst>
+      <p:ext uri="{BB962C8B-B14F-4D97-AF65-F5344CB8AC3E}">
+        <p14:creationId xmlns:p14="http://schemas.microsoft.com/office/powerpoint/2010/main" val="3723987516"/>
+      </p:ext>
+    </p:extLst>
+  </p:cSld>
+  <p:clrMapOvr>
+    <a:masterClrMapping/>
+  </p:clrMapOvr>
+</p:sld>
+</file>
+
+<file path=ppt/slides/slide36.xml><?xml version="1.0" encoding="utf-8"?>
+<p:sld xmlns:a="http://schemas.openxmlformats.org/drawingml/2006/main" xmlns:r="http://schemas.openxmlformats.org/officeDocument/2006/relationships" xmlns:p="http://schemas.openxmlformats.org/presentationml/2006/main">
+  <p:cSld>
+    <p:spTree>
+      <p:nvGrpSpPr>
+        <p:cNvPr id="1" name=""/>
+        <p:cNvGrpSpPr/>
+        <p:nvPr/>
+      </p:nvGrpSpPr>
+      <p:grpSpPr>
+        <a:xfrm>
+          <a:off x="0" y="0"/>
+          <a:ext cx="0" cy="0"/>
+          <a:chOff x="0" y="0"/>
+          <a:chExt cx="0" cy="0"/>
+        </a:xfrm>
+      </p:grpSpPr>
+      <p:sp>
+        <p:nvSpPr>
+          <p:cNvPr id="2" name="Title 1"/>
+          <p:cNvSpPr>
+            <a:spLocks noGrp="1"/>
+          </p:cNvSpPr>
+          <p:nvPr>
+            <p:ph type="title"/>
+          </p:nvPr>
+        </p:nvSpPr>
+        <p:spPr/>
+        <p:txBody>
+          <a:bodyPr/>
+          <a:lstStyle/>
+          <a:p>
+            <a:r>
+              <a:rPr lang="en-US" dirty="0"/>
+              <a:t>Linear mixed model </a:t>
+            </a:r>
+            <a:r>
+              <a:rPr lang="en-US" dirty="0" smtClean="0"/>
+              <a:t>for Fulton’s K</a:t>
+            </a:r>
+            <a:endParaRPr lang="en-US" dirty="0"/>
+          </a:p>
+        </p:txBody>
+      </p:sp>
+      <p:pic>
+        <p:nvPicPr>
+          <p:cNvPr id="3" name="Picture 2"/>
+          <p:cNvPicPr>
+            <a:picLocks noChangeAspect="1"/>
+          </p:cNvPicPr>
+          <p:nvPr/>
+        </p:nvPicPr>
+        <p:blipFill>
+          <a:blip r:embed="rId2"/>
+          <a:stretch>
+            <a:fillRect/>
+          </a:stretch>
+        </p:blipFill>
+        <p:spPr>
+          <a:xfrm>
+            <a:off x="2185730" y="1690688"/>
+            <a:ext cx="8467976" cy="4995091"/>
+          </a:xfrm>
+          <a:prstGeom prst="rect">
+            <a:avLst/>
+          </a:prstGeom>
+        </p:spPr>
+      </p:pic>
+    </p:spTree>
+    <p:extLst>
+      <p:ext uri="{BB962C8B-B14F-4D97-AF65-F5344CB8AC3E}">
+        <p14:creationId xmlns:p14="http://schemas.microsoft.com/office/powerpoint/2010/main" val="3692322207"/>
+      </p:ext>
+    </p:extLst>
+  </p:cSld>
+  <p:clrMapOvr>
+    <a:masterClrMapping/>
+  </p:clrMapOvr>
+</p:sld>
+</file>
+
 <file path=ppt/slides/slide4.xml><?xml version="1.0" encoding="utf-8"?>
 <p:sld xmlns:a="http://schemas.openxmlformats.org/drawingml/2006/main" xmlns:r="http://schemas.openxmlformats.org/officeDocument/2006/relationships" xmlns:p="http://schemas.openxmlformats.org/presentationml/2006/main">
   <p:cSld>
@@ -4629,47 +5440,13 @@
           <a:chExt cx="0" cy="0"/>
         </a:xfrm>
       </p:grpSpPr>
-      <p:sp>
-        <p:nvSpPr>
-          <p:cNvPr id="2" name="Title 1"/>
-          <p:cNvSpPr>
-            <a:spLocks noGrp="1"/>
-          </p:cNvSpPr>
-          <p:nvPr>
-            <p:ph type="title"/>
-          </p:nvPr>
-        </p:nvSpPr>
-        <p:spPr>
-          <a:xfrm>
-            <a:off x="838200" y="209008"/>
-            <a:ext cx="10515600" cy="1325563"/>
-          </a:xfrm>
-        </p:spPr>
-        <p:txBody>
-          <a:bodyPr/>
-          <a:lstStyle/>
-          <a:p>
-            <a:r>
-              <a:rPr lang="en-US" dirty="0" err="1" smtClean="0"/>
-              <a:t>ggplot</a:t>
-            </a:r>
-            <a:r>
-              <a:rPr lang="en-US" dirty="0" smtClean="0"/>
-              <a:t> scatter + treatment </a:t>
-            </a:r>
-            <a:endParaRPr lang="en-US" dirty="0"/>
-          </a:p>
-        </p:txBody>
-      </p:sp>
       <p:pic>
         <p:nvPicPr>
-          <p:cNvPr id="6" name="Content Placeholder 5"/>
+          <p:cNvPr id="3" name="Picture 2"/>
           <p:cNvPicPr>
-            <a:picLocks noGrp="1" noChangeAspect="1"/>
+            <a:picLocks noChangeAspect="1"/>
           </p:cNvPicPr>
-          <p:nvPr>
-            <p:ph idx="1"/>
-          </p:nvPr>
+          <p:nvPr/>
         </p:nvPicPr>
         <p:blipFill>
           <a:blip r:embed="rId2"/>
@@ -4679,8 +5456,80 @@
         </p:blipFill>
         <p:spPr>
           <a:xfrm>
-            <a:off x="2259425" y="1534571"/>
-            <a:ext cx="7673149" cy="4735429"/>
+            <a:off x="4" y="6"/>
+            <a:ext cx="5333334" cy="3291429"/>
+          </a:xfrm>
+          <a:prstGeom prst="rect">
+            <a:avLst/>
+          </a:prstGeom>
+        </p:spPr>
+      </p:pic>
+      <p:pic>
+        <p:nvPicPr>
+          <p:cNvPr id="4" name="Picture 3"/>
+          <p:cNvPicPr>
+            <a:picLocks noChangeAspect="1"/>
+          </p:cNvPicPr>
+          <p:nvPr/>
+        </p:nvPicPr>
+        <p:blipFill>
+          <a:blip r:embed="rId3"/>
+          <a:stretch>
+            <a:fillRect/>
+          </a:stretch>
+        </p:blipFill>
+        <p:spPr>
+          <a:xfrm>
+            <a:off x="6602363" y="6"/>
+            <a:ext cx="5333334" cy="3291429"/>
+          </a:xfrm>
+          <a:prstGeom prst="rect">
+            <a:avLst/>
+          </a:prstGeom>
+        </p:spPr>
+      </p:pic>
+      <p:pic>
+        <p:nvPicPr>
+          <p:cNvPr id="5" name="Picture 4"/>
+          <p:cNvPicPr>
+            <a:picLocks noChangeAspect="1"/>
+          </p:cNvPicPr>
+          <p:nvPr/>
+        </p:nvPicPr>
+        <p:blipFill>
+          <a:blip r:embed="rId4"/>
+          <a:stretch>
+            <a:fillRect/>
+          </a:stretch>
+        </p:blipFill>
+        <p:spPr>
+          <a:xfrm>
+            <a:off x="134529" y="3390836"/>
+            <a:ext cx="5333334" cy="3291429"/>
+          </a:xfrm>
+          <a:prstGeom prst="rect">
+            <a:avLst/>
+          </a:prstGeom>
+        </p:spPr>
+      </p:pic>
+      <p:pic>
+        <p:nvPicPr>
+          <p:cNvPr id="6" name="Picture 5"/>
+          <p:cNvPicPr>
+            <a:picLocks noChangeAspect="1"/>
+          </p:cNvPicPr>
+          <p:nvPr/>
+        </p:nvPicPr>
+        <p:blipFill>
+          <a:blip r:embed="rId5"/>
+          <a:stretch>
+            <a:fillRect/>
+          </a:stretch>
+        </p:blipFill>
+        <p:spPr>
+          <a:xfrm>
+            <a:off x="6602363" y="3291435"/>
+            <a:ext cx="5333334" cy="3291429"/>
           </a:xfrm>
           <a:prstGeom prst="rect">
             <a:avLst/>
@@ -4690,7 +5539,7 @@
     </p:spTree>
     <p:extLst>
       <p:ext uri="{BB962C8B-B14F-4D97-AF65-F5344CB8AC3E}">
-        <p14:creationId xmlns:p14="http://schemas.microsoft.com/office/powerpoint/2010/main" val="1450444940"/>
+        <p14:creationId xmlns:p14="http://schemas.microsoft.com/office/powerpoint/2010/main" val="1844039151"/>
       </p:ext>
     </p:extLst>
   </p:cSld>
@@ -4727,14 +5576,23 @@
             <p:ph type="title"/>
           </p:nvPr>
         </p:nvSpPr>
-        <p:spPr/>
-        <p:txBody>
-          <a:bodyPr/>
-          <a:lstStyle/>
-          <a:p>
+        <p:spPr>
+          <a:xfrm>
+            <a:off x="838200" y="209008"/>
+            <a:ext cx="10515600" cy="1325563"/>
+          </a:xfrm>
+        </p:spPr>
+        <p:txBody>
+          <a:bodyPr/>
+          <a:lstStyle/>
+          <a:p>
+            <a:r>
+              <a:rPr lang="en-US" dirty="0" err="1" smtClean="0"/>
+              <a:t>ggplot</a:t>
+            </a:r>
             <a:r>
               <a:rPr lang="en-US" dirty="0" smtClean="0"/>
-              <a:t>Faceted by treatment</a:t>
+              <a:t> scatter + treatment </a:t>
             </a:r>
             <a:endParaRPr lang="en-US" dirty="0"/>
           </a:p>
@@ -4742,7 +5600,7 @@
       </p:sp>
       <p:pic>
         <p:nvPicPr>
-          <p:cNvPr id="7" name="Content Placeholder 6"/>
+          <p:cNvPr id="6" name="Content Placeholder 5"/>
           <p:cNvPicPr>
             <a:picLocks noGrp="1" noChangeAspect="1"/>
           </p:cNvPicPr>
@@ -4758,8 +5616,8 @@
         </p:blipFill>
         <p:spPr>
           <a:xfrm>
-            <a:off x="2156343" y="1609614"/>
-            <a:ext cx="7879313" cy="4862662"/>
+            <a:off x="2259425" y="1534571"/>
+            <a:ext cx="7673149" cy="4735429"/>
           </a:xfrm>
           <a:prstGeom prst="rect">
             <a:avLst/>
@@ -4769,7 +5627,7 @@
     </p:spTree>
     <p:extLst>
       <p:ext uri="{BB962C8B-B14F-4D97-AF65-F5344CB8AC3E}">
-        <p14:creationId xmlns:p14="http://schemas.microsoft.com/office/powerpoint/2010/main" val="1568931333"/>
+        <p14:creationId xmlns:p14="http://schemas.microsoft.com/office/powerpoint/2010/main" val="1450444940"/>
       </p:ext>
     </p:extLst>
   </p:cSld>
@@ -4813,7 +5671,7 @@
           <a:p>
             <a:r>
               <a:rPr lang="en-US" dirty="0" smtClean="0"/>
-              <a:t>Faceted by MOATS</a:t>
+              <a:t>Faceted by treatment</a:t>
             </a:r>
             <a:endParaRPr lang="en-US" dirty="0"/>
           </a:p>
@@ -4837,8 +5695,8 @@
         </p:blipFill>
         <p:spPr>
           <a:xfrm>
-            <a:off x="2267855" y="1567589"/>
-            <a:ext cx="7656289" cy="4725024"/>
+            <a:off x="2156343" y="1609614"/>
+            <a:ext cx="7879313" cy="4862662"/>
           </a:xfrm>
           <a:prstGeom prst="rect">
             <a:avLst/>
@@ -4848,7 +5706,7 @@
     </p:spTree>
     <p:extLst>
       <p:ext uri="{BB962C8B-B14F-4D97-AF65-F5344CB8AC3E}">
-        <p14:creationId xmlns:p14="http://schemas.microsoft.com/office/powerpoint/2010/main" val="1227977771"/>
+        <p14:creationId xmlns:p14="http://schemas.microsoft.com/office/powerpoint/2010/main" val="1568931333"/>
       </p:ext>
     </p:extLst>
   </p:cSld>
@@ -4892,7 +5750,7 @@
           <a:p>
             <a:r>
               <a:rPr lang="en-US" dirty="0" smtClean="0"/>
-              <a:t>Boxplot by treatment</a:t>
+              <a:t>Faceted by MOATS</a:t>
             </a:r>
             <a:endParaRPr lang="en-US" dirty="0"/>
           </a:p>
@@ -4900,11 +5758,13 @@
       </p:sp>
       <p:pic>
         <p:nvPicPr>
-          <p:cNvPr id="4" name="Picture 3"/>
+          <p:cNvPr id="7" name="Content Placeholder 6"/>
           <p:cNvPicPr>
-            <a:picLocks noChangeAspect="1"/>
+            <a:picLocks noGrp="1" noChangeAspect="1"/>
           </p:cNvPicPr>
-          <p:nvPr/>
+          <p:nvPr>
+            <p:ph idx="1"/>
+          </p:nvPr>
         </p:nvPicPr>
         <p:blipFill>
           <a:blip r:embed="rId2"/>
@@ -4914,8 +5774,8 @@
         </p:blipFill>
         <p:spPr>
           <a:xfrm>
-            <a:off x="2351489" y="1690688"/>
-            <a:ext cx="7489021" cy="4621796"/>
+            <a:off x="2267855" y="1567589"/>
+            <a:ext cx="7656289" cy="4725024"/>
           </a:xfrm>
           <a:prstGeom prst="rect">
             <a:avLst/>
@@ -4925,7 +5785,7 @@
     </p:spTree>
     <p:extLst>
       <p:ext uri="{BB962C8B-B14F-4D97-AF65-F5344CB8AC3E}">
-        <p14:creationId xmlns:p14="http://schemas.microsoft.com/office/powerpoint/2010/main" val="369326488"/>
+        <p14:creationId xmlns:p14="http://schemas.microsoft.com/office/powerpoint/2010/main" val="1227977771"/>
       </p:ext>
     </p:extLst>
   </p:cSld>
@@ -4969,7 +5829,7 @@
           <a:p>
             <a:r>
               <a:rPr lang="en-US" dirty="0" smtClean="0"/>
-              <a:t>Boxplot by treatment + points</a:t>
+              <a:t>Boxplot by treatment</a:t>
             </a:r>
             <a:endParaRPr lang="en-US" dirty="0"/>
           </a:p>
@@ -4977,13 +5837,11 @@
       </p:sp>
       <p:pic>
         <p:nvPicPr>
-          <p:cNvPr id="7" name="Content Placeholder 6"/>
+          <p:cNvPr id="4" name="Picture 3"/>
           <p:cNvPicPr>
-            <a:picLocks noGrp="1" noChangeAspect="1"/>
+            <a:picLocks noChangeAspect="1"/>
           </p:cNvPicPr>
-          <p:nvPr>
-            <p:ph idx="1"/>
-          </p:nvPr>
+          <p:nvPr/>
         </p:nvPicPr>
         <p:blipFill>
           <a:blip r:embed="rId2"/>
@@ -4993,8 +5851,8 @@
         </p:blipFill>
         <p:spPr>
           <a:xfrm>
-            <a:off x="2407245" y="1817694"/>
-            <a:ext cx="7377509" cy="4552977"/>
+            <a:off x="2351489" y="1690688"/>
+            <a:ext cx="7489021" cy="4621796"/>
           </a:xfrm>
           <a:prstGeom prst="rect">
             <a:avLst/>
@@ -5004,7 +5862,7 @@
     </p:spTree>
     <p:extLst>
       <p:ext uri="{BB962C8B-B14F-4D97-AF65-F5344CB8AC3E}">
-        <p14:creationId xmlns:p14="http://schemas.microsoft.com/office/powerpoint/2010/main" val="3927715870"/>
+        <p14:creationId xmlns:p14="http://schemas.microsoft.com/office/powerpoint/2010/main" val="369326488"/>
       </p:ext>
     </p:extLst>
   </p:cSld>
@@ -5048,7 +5906,7 @@
           <a:p>
             <a:r>
               <a:rPr lang="en-US" dirty="0" smtClean="0"/>
-              <a:t>Length at treatment</a:t>
+              <a:t>Boxplot by treatment + points</a:t>
             </a:r>
             <a:endParaRPr lang="en-US" dirty="0"/>
           </a:p>
@@ -5056,7 +5914,7 @@
       </p:sp>
       <p:pic>
         <p:nvPicPr>
-          <p:cNvPr id="6" name="Content Placeholder 5"/>
+          <p:cNvPr id="7" name="Content Placeholder 6"/>
           <p:cNvPicPr>
             <a:picLocks noGrp="1" noChangeAspect="1"/>
           </p:cNvPicPr>
@@ -5072,8 +5930,8 @@
         </p:blipFill>
         <p:spPr>
           <a:xfrm>
-            <a:off x="2273431" y="1866092"/>
-            <a:ext cx="7645138" cy="4718142"/>
+            <a:off x="2407245" y="1817694"/>
+            <a:ext cx="7377509" cy="4552977"/>
           </a:xfrm>
           <a:prstGeom prst="rect">
             <a:avLst/>
@@ -5083,7 +5941,7 @@
     </p:spTree>
     <p:extLst>
       <p:ext uri="{BB962C8B-B14F-4D97-AF65-F5344CB8AC3E}">
-        <p14:creationId xmlns:p14="http://schemas.microsoft.com/office/powerpoint/2010/main" val="3312429944"/>
+        <p14:creationId xmlns:p14="http://schemas.microsoft.com/office/powerpoint/2010/main" val="3927715870"/>
       </p:ext>
     </p:extLst>
   </p:cSld>

</xml_diff>